<commit_message>
Changed TonnelliShanksAlgorithm to use ZModPElements
</commit_message>
<xml_diff>
--- a/smallstepgiantstep/Elliptic Curve.pptx
+++ b/smallstepgiantstep/Elliptic Curve.pptx
@@ -13,6 +13,7 @@
     <p:sldId id="263" r:id="rId7"/>
     <p:sldId id="259" r:id="rId8"/>
     <p:sldId id="262" r:id="rId9"/>
+    <p:sldId id="264" r:id="rId10"/>
   </p:sldIdLst>
   <p:sldSz cx="12192000" cy="6858000"/>
   <p:notesSz cx="6858000" cy="9144000"/>
@@ -268,7 +269,7 @@
           <a:p>
             <a:fld id="{4AAF318C-B15B-B14A-B88E-D91B1F600C11}" type="datetimeFigureOut">
               <a:rPr lang="de-DE" smtClean="0"/>
-              <a:t>05.01.19</a:t>
+              <a:t>09.01.19</a:t>
             </a:fld>
             <a:endParaRPr lang="de-DE"/>
           </a:p>
@@ -468,7 +469,7 @@
           <a:p>
             <a:fld id="{4AAF318C-B15B-B14A-B88E-D91B1F600C11}" type="datetimeFigureOut">
               <a:rPr lang="de-DE" smtClean="0"/>
-              <a:t>05.01.19</a:t>
+              <a:t>09.01.19</a:t>
             </a:fld>
             <a:endParaRPr lang="de-DE"/>
           </a:p>
@@ -678,7 +679,7 @@
           <a:p>
             <a:fld id="{4AAF318C-B15B-B14A-B88E-D91B1F600C11}" type="datetimeFigureOut">
               <a:rPr lang="de-DE" smtClean="0"/>
-              <a:t>05.01.19</a:t>
+              <a:t>09.01.19</a:t>
             </a:fld>
             <a:endParaRPr lang="de-DE"/>
           </a:p>
@@ -878,7 +879,7 @@
           <a:p>
             <a:fld id="{4AAF318C-B15B-B14A-B88E-D91B1F600C11}" type="datetimeFigureOut">
               <a:rPr lang="de-DE" smtClean="0"/>
-              <a:t>05.01.19</a:t>
+              <a:t>09.01.19</a:t>
             </a:fld>
             <a:endParaRPr lang="de-DE"/>
           </a:p>
@@ -1154,7 +1155,7 @@
           <a:p>
             <a:fld id="{4AAF318C-B15B-B14A-B88E-D91B1F600C11}" type="datetimeFigureOut">
               <a:rPr lang="de-DE" smtClean="0"/>
-              <a:t>05.01.19</a:t>
+              <a:t>09.01.19</a:t>
             </a:fld>
             <a:endParaRPr lang="de-DE"/>
           </a:p>
@@ -1422,7 +1423,7 @@
           <a:p>
             <a:fld id="{4AAF318C-B15B-B14A-B88E-D91B1F600C11}" type="datetimeFigureOut">
               <a:rPr lang="de-DE" smtClean="0"/>
-              <a:t>05.01.19</a:t>
+              <a:t>09.01.19</a:t>
             </a:fld>
             <a:endParaRPr lang="de-DE"/>
           </a:p>
@@ -1837,7 +1838,7 @@
           <a:p>
             <a:fld id="{4AAF318C-B15B-B14A-B88E-D91B1F600C11}" type="datetimeFigureOut">
               <a:rPr lang="de-DE" smtClean="0"/>
-              <a:t>05.01.19</a:t>
+              <a:t>09.01.19</a:t>
             </a:fld>
             <a:endParaRPr lang="de-DE"/>
           </a:p>
@@ -1979,7 +1980,7 @@
           <a:p>
             <a:fld id="{4AAF318C-B15B-B14A-B88E-D91B1F600C11}" type="datetimeFigureOut">
               <a:rPr lang="de-DE" smtClean="0"/>
-              <a:t>05.01.19</a:t>
+              <a:t>09.01.19</a:t>
             </a:fld>
             <a:endParaRPr lang="de-DE"/>
           </a:p>
@@ -2092,7 +2093,7 @@
           <a:p>
             <a:fld id="{4AAF318C-B15B-B14A-B88E-D91B1F600C11}" type="datetimeFigureOut">
               <a:rPr lang="de-DE" smtClean="0"/>
-              <a:t>05.01.19</a:t>
+              <a:t>09.01.19</a:t>
             </a:fld>
             <a:endParaRPr lang="de-DE"/>
           </a:p>
@@ -2405,7 +2406,7 @@
           <a:p>
             <a:fld id="{4AAF318C-B15B-B14A-B88E-D91B1F600C11}" type="datetimeFigureOut">
               <a:rPr lang="de-DE" smtClean="0"/>
-              <a:t>05.01.19</a:t>
+              <a:t>09.01.19</a:t>
             </a:fld>
             <a:endParaRPr lang="de-DE"/>
           </a:p>
@@ -2694,7 +2695,7 @@
           <a:p>
             <a:fld id="{4AAF318C-B15B-B14A-B88E-D91B1F600C11}" type="datetimeFigureOut">
               <a:rPr lang="de-DE" smtClean="0"/>
-              <a:t>05.01.19</a:t>
+              <a:t>09.01.19</a:t>
             </a:fld>
             <a:endParaRPr lang="de-DE"/>
           </a:p>
@@ -2937,7 +2938,7 @@
           <a:p>
             <a:fld id="{4AAF318C-B15B-B14A-B88E-D91B1F600C11}" type="datetimeFigureOut">
               <a:rPr lang="de-DE" smtClean="0"/>
-              <a:t>05.01.19</a:t>
+              <a:t>09.01.19</a:t>
             </a:fld>
             <a:endParaRPr lang="de-DE"/>
           </a:p>
@@ -4293,7 +4294,7 @@
             </a:r>
             <a:r>
               <a:rPr lang="de-DE" dirty="0"/>
-              <a:t>-Gleichung y2 =x3 +x+1 </a:t>
+              <a:t>-Gleichung y^2 =x3 +x+1 </a:t>
             </a:r>
             <a:r>
               <a:rPr lang="de-DE" dirty="0" err="1"/>
@@ -6492,7 +6493,10 @@
           <a:bodyPr/>
           <a:lstStyle/>
           <a:p>
-            <a:endParaRPr lang="de-DE"/>
+            <a:r>
+              <a:rPr lang="de-DE" dirty="0"/>
+              <a:t>1b</a:t>
+            </a:r>
           </a:p>
         </p:txBody>
       </p:sp>
@@ -6512,12 +6516,55 @@
             <p:ph idx="1"/>
           </p:nvPr>
         </p:nvSpPr>
-        <p:spPr/>
-        <p:txBody>
-          <a:bodyPr/>
+        <p:spPr>
+          <a:xfrm>
+            <a:off x="838200" y="1825625"/>
+            <a:ext cx="10515600" cy="4351338"/>
+          </a:xfrm>
+        </p:spPr>
+        <p:txBody>
+          <a:bodyPr>
+            <a:normAutofit/>
+          </a:bodyPr>
           <a:lstStyle/>
           <a:p>
-            <a:endParaRPr lang="de-DE"/>
+            <a:pPr marL="0" indent="0">
+              <a:buNone/>
+            </a:pPr>
+            <a:r>
+              <a:rPr lang="de-DE" dirty="0"/>
+              <a:t>Der Punkt P = (</a:t>
+            </a:r>
+            <a:r>
+              <a:rPr lang="de-DE" dirty="0" err="1"/>
+              <a:t>xP</a:t>
+            </a:r>
+            <a:r>
+              <a:rPr lang="de-DE" dirty="0"/>
+              <a:t>, </a:t>
+            </a:r>
+            <a:r>
+              <a:rPr lang="de-DE" dirty="0" err="1"/>
+              <a:t>yP</a:t>
+            </a:r>
+            <a:r>
+              <a:rPr lang="de-DE" dirty="0"/>
+              <a:t>) = (11, 33) liegt auf E. Ermitteln Sie Q = 111  P mittels schneller </a:t>
+            </a:r>
+            <a:r>
+              <a:rPr lang="de-DE" dirty="0" err="1"/>
+              <a:t>Exponentiation</a:t>
+            </a:r>
+            <a:r>
+              <a:rPr lang="de-DE" dirty="0"/>
+              <a:t>. </a:t>
+            </a:r>
+          </a:p>
+          <a:p>
+            <a:pPr marL="0" indent="0">
+              <a:buNone/>
+            </a:pPr>
+            <a:endParaRPr lang="de-DE" dirty="0"/>
           </a:p>
         </p:txBody>
       </p:sp>
@@ -6525,6 +6572,914 @@
     <p:extLst>
       <p:ext uri="{BB962C8B-B14F-4D97-AF65-F5344CB8AC3E}">
         <p14:creationId xmlns:p14="http://schemas.microsoft.com/office/powerpoint/2010/main" val="726557714"/>
+      </p:ext>
+    </p:extLst>
+  </p:cSld>
+  <p:clrMapOvr>
+    <a:masterClrMapping/>
+  </p:clrMapOvr>
+</p:sld>
+</file>
+
+<file path=ppt/slides/slide9.xml><?xml version="1.0" encoding="utf-8"?>
+<p:sld xmlns:a="http://schemas.openxmlformats.org/drawingml/2006/main" xmlns:r="http://schemas.openxmlformats.org/officeDocument/2006/relationships" xmlns:p="http://schemas.openxmlformats.org/presentationml/2006/main">
+  <p:cSld>
+    <p:spTree>
+      <p:nvGrpSpPr>
+        <p:cNvPr id="1" name=""/>
+        <p:cNvGrpSpPr/>
+        <p:nvPr/>
+      </p:nvGrpSpPr>
+      <p:grpSpPr>
+        <a:xfrm>
+          <a:off x="0" y="0"/>
+          <a:ext cx="0" cy="0"/>
+          <a:chOff x="0" y="0"/>
+          <a:chExt cx="0" cy="0"/>
+        </a:xfrm>
+      </p:grpSpPr>
+      <p:sp>
+        <p:nvSpPr>
+          <p:cNvPr id="2" name="Title 1">
+            <a:extLst>
+              <a:ext uri="{FF2B5EF4-FFF2-40B4-BE49-F238E27FC236}">
+                <a16:creationId xmlns:a16="http://schemas.microsoft.com/office/drawing/2014/main" id="{CCC8E892-8DA3-D840-90B8-FBA3AF5C7396}"/>
+              </a:ext>
+            </a:extLst>
+          </p:cNvPr>
+          <p:cNvSpPr>
+            <a:spLocks noGrp="1"/>
+          </p:cNvSpPr>
+          <p:nvPr>
+            <p:ph type="title"/>
+          </p:nvPr>
+        </p:nvSpPr>
+        <p:spPr/>
+        <p:txBody>
+          <a:bodyPr/>
+          <a:lstStyle/>
+          <a:p>
+            <a:r>
+              <a:rPr lang="de-DE" dirty="0"/>
+              <a:t>Schnelle </a:t>
+            </a:r>
+            <a:r>
+              <a:rPr lang="de-DE" dirty="0" err="1"/>
+              <a:t>Exponentiation</a:t>
+            </a:r>
+            <a:endParaRPr lang="de-DE" dirty="0"/>
+          </a:p>
+        </p:txBody>
+      </p:sp>
+      <p:sp>
+        <p:nvSpPr>
+          <p:cNvPr id="3" name="Content Placeholder 2">
+            <a:extLst>
+              <a:ext uri="{FF2B5EF4-FFF2-40B4-BE49-F238E27FC236}">
+                <a16:creationId xmlns:a16="http://schemas.microsoft.com/office/drawing/2014/main" id="{536C33F7-3511-C749-A209-591B7A4C7850}"/>
+              </a:ext>
+            </a:extLst>
+          </p:cNvPr>
+          <p:cNvSpPr>
+            <a:spLocks noGrp="1"/>
+          </p:cNvSpPr>
+          <p:nvPr>
+            <p:ph idx="1"/>
+          </p:nvPr>
+        </p:nvSpPr>
+        <p:spPr/>
+        <p:txBody>
+          <a:bodyPr>
+            <a:normAutofit fontScale="70000" lnSpcReduction="20000"/>
+          </a:bodyPr>
+          <a:lstStyle/>
+          <a:p>
+            <a:pPr marL="0" indent="0">
+              <a:buNone/>
+            </a:pPr>
+            <a:r>
+              <a:rPr lang="de-DE" dirty="0" err="1"/>
+              <a:t>EllipticCurveActualElement</a:t>
+            </a:r>
+            <a:r>
+              <a:rPr lang="de-DE" dirty="0"/>
+              <a:t> p = </a:t>
+            </a:r>
+            <a:r>
+              <a:rPr lang="de-DE" dirty="0" err="1"/>
+              <a:t>group.getElement</a:t>
+            </a:r>
+            <a:r>
+              <a:rPr lang="de-DE" dirty="0"/>
+              <a:t>(</a:t>
+            </a:r>
+            <a:r>
+              <a:rPr lang="de-DE" dirty="0">
+                <a:solidFill>
+                  <a:srgbClr val="6897BB"/>
+                </a:solidFill>
+              </a:rPr>
+              <a:t>11</a:t>
+            </a:r>
+            <a:r>
+              <a:rPr lang="de-DE" dirty="0">
+                <a:solidFill>
+                  <a:srgbClr val="CC7832"/>
+                </a:solidFill>
+              </a:rPr>
+              <a:t>, </a:t>
+            </a:r>
+            <a:r>
+              <a:rPr lang="de-DE" dirty="0">
+                <a:solidFill>
+                  <a:srgbClr val="6897BB"/>
+                </a:solidFill>
+              </a:rPr>
+              <a:t>33</a:t>
+            </a:r>
+            <a:r>
+              <a:rPr lang="de-DE" dirty="0"/>
+              <a:t>)</a:t>
+            </a:r>
+            <a:r>
+              <a:rPr lang="de-DE" dirty="0">
+                <a:solidFill>
+                  <a:srgbClr val="CC7832"/>
+                </a:solidFill>
+              </a:rPr>
+              <a:t>;</a:t>
+            </a:r>
+            <a:br>
+              <a:rPr lang="de-DE" dirty="0">
+                <a:solidFill>
+                  <a:srgbClr val="CC7832"/>
+                </a:solidFill>
+              </a:rPr>
+            </a:br>
+            <a:r>
+              <a:rPr lang="de-DE" dirty="0" err="1"/>
+              <a:t>EllipticCurveGroupElement</a:t>
+            </a:r>
+            <a:r>
+              <a:rPr lang="de-DE" dirty="0"/>
+              <a:t> </a:t>
+            </a:r>
+            <a:r>
+              <a:rPr lang="de-DE" dirty="0" err="1"/>
+              <a:t>q</a:t>
+            </a:r>
+            <a:r>
+              <a:rPr lang="de-DE" dirty="0"/>
+              <a:t> = </a:t>
+            </a:r>
+            <a:r>
+              <a:rPr lang="de-DE" dirty="0" err="1"/>
+              <a:t>p.pow</a:t>
+            </a:r>
+            <a:r>
+              <a:rPr lang="de-DE" dirty="0"/>
+              <a:t>(</a:t>
+            </a:r>
+            <a:r>
+              <a:rPr lang="de-DE" dirty="0">
+                <a:solidFill>
+                  <a:srgbClr val="6897BB"/>
+                </a:solidFill>
+              </a:rPr>
+              <a:t>111</a:t>
+            </a:r>
+            <a:r>
+              <a:rPr lang="de-DE" dirty="0"/>
+              <a:t>)</a:t>
+            </a:r>
+            <a:r>
+              <a:rPr lang="de-DE" dirty="0">
+                <a:solidFill>
+                  <a:srgbClr val="CC7832"/>
+                </a:solidFill>
+              </a:rPr>
+              <a:t>;</a:t>
+            </a:r>
+          </a:p>
+          <a:p>
+            <a:pPr marL="0" indent="0">
+              <a:buNone/>
+            </a:pPr>
+            <a:br>
+              <a:rPr lang="de-DE" dirty="0">
+                <a:solidFill>
+                  <a:srgbClr val="BBB529"/>
+                </a:solidFill>
+              </a:rPr>
+            </a:br>
+            <a:r>
+              <a:rPr lang="de-DE" dirty="0" err="1">
+                <a:solidFill>
+                  <a:srgbClr val="CC7832"/>
+                </a:solidFill>
+              </a:rPr>
+              <a:t>public</a:t>
+            </a:r>
+            <a:r>
+              <a:rPr lang="de-DE" dirty="0">
+                <a:solidFill>
+                  <a:srgbClr val="CC7832"/>
+                </a:solidFill>
+              </a:rPr>
+              <a:t> </a:t>
+            </a:r>
+            <a:r>
+              <a:rPr lang="de-DE" dirty="0" err="1"/>
+              <a:t>EllipticCurveGroupElement</a:t>
+            </a:r>
+            <a:r>
+              <a:rPr lang="de-DE" dirty="0"/>
+              <a:t> </a:t>
+            </a:r>
+            <a:r>
+              <a:rPr lang="de-DE" dirty="0" err="1">
+                <a:solidFill>
+                  <a:srgbClr val="FFC66D"/>
+                </a:solidFill>
+              </a:rPr>
+              <a:t>pow</a:t>
+            </a:r>
+            <a:r>
+              <a:rPr lang="de-DE" dirty="0"/>
+              <a:t>(</a:t>
+            </a:r>
+            <a:r>
+              <a:rPr lang="de-DE" dirty="0" err="1"/>
+              <a:t>BigInteger</a:t>
+            </a:r>
+            <a:r>
+              <a:rPr lang="de-DE" dirty="0"/>
+              <a:t> </a:t>
+            </a:r>
+            <a:r>
+              <a:rPr lang="de-DE" dirty="0" err="1"/>
+              <a:t>e</a:t>
+            </a:r>
+            <a:r>
+              <a:rPr lang="de-DE" dirty="0"/>
+              <a:t>) {</a:t>
+            </a:r>
+            <a:br>
+              <a:rPr lang="de-DE" dirty="0"/>
+            </a:br>
+            <a:r>
+              <a:rPr lang="de-DE" dirty="0"/>
+              <a:t>    </a:t>
+            </a:r>
+            <a:r>
+              <a:rPr lang="de-DE" dirty="0" err="1">
+                <a:solidFill>
+                  <a:srgbClr val="CC7832"/>
+                </a:solidFill>
+              </a:rPr>
+              <a:t>if</a:t>
+            </a:r>
+            <a:r>
+              <a:rPr lang="de-DE" dirty="0">
+                <a:solidFill>
+                  <a:srgbClr val="CC7832"/>
+                </a:solidFill>
+              </a:rPr>
+              <a:t> </a:t>
+            </a:r>
+            <a:r>
+              <a:rPr lang="de-DE" dirty="0"/>
+              <a:t>(</a:t>
+            </a:r>
+            <a:r>
+              <a:rPr lang="de-DE" dirty="0" err="1"/>
+              <a:t>e.signum</a:t>
+            </a:r>
+            <a:r>
+              <a:rPr lang="de-DE" dirty="0"/>
+              <a:t>() == -</a:t>
+            </a:r>
+            <a:r>
+              <a:rPr lang="de-DE" dirty="0">
+                <a:solidFill>
+                  <a:srgbClr val="6897BB"/>
+                </a:solidFill>
+              </a:rPr>
+              <a:t>1 </a:t>
+            </a:r>
+            <a:r>
+              <a:rPr lang="de-DE" dirty="0"/>
+              <a:t>)</a:t>
+            </a:r>
+            <a:br>
+              <a:rPr lang="de-DE" dirty="0"/>
+            </a:br>
+            <a:r>
+              <a:rPr lang="de-DE" dirty="0"/>
+              <a:t>        </a:t>
+            </a:r>
+            <a:r>
+              <a:rPr lang="de-DE" dirty="0" err="1">
+                <a:solidFill>
+                  <a:srgbClr val="CC7832"/>
+                </a:solidFill>
+              </a:rPr>
+              <a:t>throw</a:t>
+            </a:r>
+            <a:r>
+              <a:rPr lang="de-DE" dirty="0">
+                <a:solidFill>
+                  <a:srgbClr val="CC7832"/>
+                </a:solidFill>
+              </a:rPr>
+              <a:t> </a:t>
+            </a:r>
+            <a:r>
+              <a:rPr lang="de-DE" dirty="0" err="1">
+                <a:solidFill>
+                  <a:srgbClr val="CC7832"/>
+                </a:solidFill>
+              </a:rPr>
+              <a:t>new</a:t>
+            </a:r>
+            <a:r>
+              <a:rPr lang="de-DE" dirty="0">
+                <a:solidFill>
+                  <a:srgbClr val="CC7832"/>
+                </a:solidFill>
+              </a:rPr>
+              <a:t> </a:t>
+            </a:r>
+            <a:r>
+              <a:rPr lang="de-DE" dirty="0" err="1"/>
+              <a:t>IllegalArgumentException</a:t>
+            </a:r>
+            <a:r>
+              <a:rPr lang="de-DE" dirty="0"/>
+              <a:t>(</a:t>
+            </a:r>
+            <a:r>
+              <a:rPr lang="de-DE" dirty="0">
+                <a:solidFill>
+                  <a:srgbClr val="6A8759"/>
+                </a:solidFill>
+              </a:rPr>
+              <a:t>"Exponent </a:t>
+            </a:r>
+            <a:r>
+              <a:rPr lang="de-DE" dirty="0" err="1">
+                <a:solidFill>
+                  <a:srgbClr val="6A8759"/>
+                </a:solidFill>
+              </a:rPr>
+              <a:t>is</a:t>
+            </a:r>
+            <a:r>
+              <a:rPr lang="de-DE" dirty="0">
+                <a:solidFill>
+                  <a:srgbClr val="6A8759"/>
+                </a:solidFill>
+              </a:rPr>
+              <a:t> </a:t>
+            </a:r>
+            <a:r>
+              <a:rPr lang="de-DE" dirty="0" err="1">
+                <a:solidFill>
+                  <a:srgbClr val="6A8759"/>
+                </a:solidFill>
+              </a:rPr>
+              <a:t>expected</a:t>
+            </a:r>
+            <a:r>
+              <a:rPr lang="de-DE" dirty="0">
+                <a:solidFill>
+                  <a:srgbClr val="6A8759"/>
+                </a:solidFill>
+              </a:rPr>
+              <a:t> </a:t>
+            </a:r>
+            <a:r>
+              <a:rPr lang="de-DE" dirty="0" err="1">
+                <a:solidFill>
+                  <a:srgbClr val="6A8759"/>
+                </a:solidFill>
+              </a:rPr>
+              <a:t>to</a:t>
+            </a:r>
+            <a:r>
+              <a:rPr lang="de-DE" dirty="0">
+                <a:solidFill>
+                  <a:srgbClr val="6A8759"/>
+                </a:solidFill>
+              </a:rPr>
+              <a:t> </a:t>
+            </a:r>
+            <a:r>
+              <a:rPr lang="de-DE" dirty="0" err="1">
+                <a:solidFill>
+                  <a:srgbClr val="6A8759"/>
+                </a:solidFill>
+              </a:rPr>
+              <a:t>be</a:t>
+            </a:r>
+            <a:r>
+              <a:rPr lang="de-DE" dirty="0">
+                <a:solidFill>
+                  <a:srgbClr val="6A8759"/>
+                </a:solidFill>
+              </a:rPr>
+              <a:t> positive."</a:t>
+            </a:r>
+            <a:r>
+              <a:rPr lang="de-DE" dirty="0"/>
+              <a:t>)</a:t>
+            </a:r>
+            <a:r>
+              <a:rPr lang="de-DE" dirty="0">
+                <a:solidFill>
+                  <a:srgbClr val="CC7832"/>
+                </a:solidFill>
+              </a:rPr>
+              <a:t>;</a:t>
+            </a:r>
+            <a:br>
+              <a:rPr lang="de-DE" dirty="0"/>
+            </a:br>
+            <a:r>
+              <a:rPr lang="de-DE" dirty="0"/>
+              <a:t>    </a:t>
+            </a:r>
+            <a:r>
+              <a:rPr lang="de-DE" dirty="0" err="1">
+                <a:solidFill>
+                  <a:srgbClr val="CC7832"/>
+                </a:solidFill>
+              </a:rPr>
+              <a:t>if</a:t>
+            </a:r>
+            <a:r>
+              <a:rPr lang="de-DE" dirty="0">
+                <a:solidFill>
+                  <a:srgbClr val="CC7832"/>
+                </a:solidFill>
+              </a:rPr>
+              <a:t> </a:t>
+            </a:r>
+            <a:r>
+              <a:rPr lang="de-DE" dirty="0"/>
+              <a:t>(</a:t>
+            </a:r>
+            <a:r>
+              <a:rPr lang="de-DE" dirty="0" err="1"/>
+              <a:t>e.signum</a:t>
+            </a:r>
+            <a:r>
+              <a:rPr lang="de-DE" dirty="0"/>
+              <a:t>() == </a:t>
+            </a:r>
+            <a:r>
+              <a:rPr lang="de-DE" dirty="0">
+                <a:solidFill>
+                  <a:srgbClr val="6897BB"/>
+                </a:solidFill>
+              </a:rPr>
+              <a:t>0</a:t>
+            </a:r>
+            <a:r>
+              <a:rPr lang="de-DE" dirty="0"/>
+              <a:t>)</a:t>
+            </a:r>
+            <a:br>
+              <a:rPr lang="de-DE" dirty="0"/>
+            </a:br>
+            <a:r>
+              <a:rPr lang="de-DE" dirty="0"/>
+              <a:t>        </a:t>
+            </a:r>
+            <a:r>
+              <a:rPr lang="de-DE" dirty="0" err="1">
+                <a:solidFill>
+                  <a:srgbClr val="CC7832"/>
+                </a:solidFill>
+              </a:rPr>
+              <a:t>return</a:t>
+            </a:r>
+            <a:r>
+              <a:rPr lang="de-DE" dirty="0">
+                <a:solidFill>
+                  <a:srgbClr val="CC7832"/>
+                </a:solidFill>
+              </a:rPr>
+              <a:t> </a:t>
+            </a:r>
+            <a:r>
+              <a:rPr lang="de-DE" dirty="0" err="1">
+                <a:solidFill>
+                  <a:srgbClr val="9876AA"/>
+                </a:solidFill>
+              </a:rPr>
+              <a:t>group</a:t>
+            </a:r>
+            <a:r>
+              <a:rPr lang="de-DE" dirty="0" err="1"/>
+              <a:t>.</a:t>
+            </a:r>
+            <a:r>
+              <a:rPr lang="de-DE" i="1" dirty="0" err="1">
+                <a:solidFill>
+                  <a:srgbClr val="9876AA"/>
+                </a:solidFill>
+              </a:rPr>
+              <a:t>NEUTRAL_ELEMENT</a:t>
+            </a:r>
+            <a:r>
+              <a:rPr lang="de-DE" dirty="0">
+                <a:solidFill>
+                  <a:srgbClr val="CC7832"/>
+                </a:solidFill>
+              </a:rPr>
+              <a:t>;</a:t>
+            </a:r>
+            <a:br>
+              <a:rPr lang="de-DE" dirty="0">
+                <a:solidFill>
+                  <a:srgbClr val="CC7832"/>
+                </a:solidFill>
+              </a:rPr>
+            </a:br>
+            <a:br>
+              <a:rPr lang="de-DE" dirty="0">
+                <a:solidFill>
+                  <a:srgbClr val="CC7832"/>
+                </a:solidFill>
+              </a:rPr>
+            </a:br>
+            <a:r>
+              <a:rPr lang="de-DE" dirty="0">
+                <a:solidFill>
+                  <a:srgbClr val="CC7832"/>
+                </a:solidFill>
+              </a:rPr>
+              <a:t>    </a:t>
+            </a:r>
+            <a:r>
+              <a:rPr lang="de-DE" dirty="0" err="1">
+                <a:solidFill>
+                  <a:srgbClr val="CC7832"/>
+                </a:solidFill>
+              </a:rPr>
+              <a:t>int</a:t>
+            </a:r>
+            <a:r>
+              <a:rPr lang="de-DE" dirty="0">
+                <a:solidFill>
+                  <a:srgbClr val="CC7832"/>
+                </a:solidFill>
+              </a:rPr>
+              <a:t> </a:t>
+            </a:r>
+            <a:r>
+              <a:rPr lang="de-DE" dirty="0" err="1"/>
+              <a:t>n</a:t>
+            </a:r>
+            <a:r>
+              <a:rPr lang="de-DE" dirty="0"/>
+              <a:t> = </a:t>
+            </a:r>
+            <a:r>
+              <a:rPr lang="de-DE" dirty="0" err="1"/>
+              <a:t>e.bitLength</a:t>
+            </a:r>
+            <a:r>
+              <a:rPr lang="de-DE" dirty="0"/>
+              <a:t>()</a:t>
+            </a:r>
+            <a:r>
+              <a:rPr lang="de-DE" dirty="0">
+                <a:solidFill>
+                  <a:srgbClr val="CC7832"/>
+                </a:solidFill>
+              </a:rPr>
+              <a:t>;</a:t>
+            </a:r>
+            <a:br>
+              <a:rPr lang="de-DE" dirty="0">
+                <a:solidFill>
+                  <a:srgbClr val="CC7832"/>
+                </a:solidFill>
+              </a:rPr>
+            </a:br>
+            <a:r>
+              <a:rPr lang="de-DE" dirty="0">
+                <a:solidFill>
+                  <a:srgbClr val="CC7832"/>
+                </a:solidFill>
+              </a:rPr>
+              <a:t>    </a:t>
+            </a:r>
+            <a:r>
+              <a:rPr lang="de-DE" dirty="0" err="1"/>
+              <a:t>EllipticCurveGroupElement</a:t>
+            </a:r>
+            <a:r>
+              <a:rPr lang="de-DE" dirty="0"/>
+              <a:t> s = </a:t>
+            </a:r>
+            <a:r>
+              <a:rPr lang="de-DE" dirty="0" err="1">
+                <a:solidFill>
+                  <a:srgbClr val="CC7832"/>
+                </a:solidFill>
+              </a:rPr>
+              <a:t>this</a:t>
+            </a:r>
+            <a:r>
+              <a:rPr lang="de-DE" dirty="0">
+                <a:solidFill>
+                  <a:srgbClr val="CC7832"/>
+                </a:solidFill>
+              </a:rPr>
+              <a:t>;</a:t>
+            </a:r>
+            <a:br>
+              <a:rPr lang="de-DE" dirty="0">
+                <a:solidFill>
+                  <a:srgbClr val="CC7832"/>
+                </a:solidFill>
+              </a:rPr>
+            </a:br>
+            <a:r>
+              <a:rPr lang="de-DE" dirty="0">
+                <a:solidFill>
+                  <a:srgbClr val="CC7832"/>
+                </a:solidFill>
+              </a:rPr>
+              <a:t>    </a:t>
+            </a:r>
+            <a:r>
+              <a:rPr lang="de-DE" dirty="0" err="1">
+                <a:solidFill>
+                  <a:srgbClr val="CC7832"/>
+                </a:solidFill>
+              </a:rPr>
+              <a:t>for</a:t>
+            </a:r>
+            <a:r>
+              <a:rPr lang="de-DE" dirty="0">
+                <a:solidFill>
+                  <a:srgbClr val="CC7832"/>
+                </a:solidFill>
+              </a:rPr>
+              <a:t> </a:t>
+            </a:r>
+            <a:r>
+              <a:rPr lang="de-DE" dirty="0"/>
+              <a:t>(</a:t>
+            </a:r>
+            <a:r>
+              <a:rPr lang="de-DE" dirty="0" err="1">
+                <a:solidFill>
+                  <a:srgbClr val="CC7832"/>
+                </a:solidFill>
+              </a:rPr>
+              <a:t>int</a:t>
+            </a:r>
+            <a:r>
+              <a:rPr lang="de-DE" dirty="0">
+                <a:solidFill>
+                  <a:srgbClr val="CC7832"/>
+                </a:solidFill>
+              </a:rPr>
+              <a:t> </a:t>
+            </a:r>
+            <a:r>
+              <a:rPr lang="de-DE" dirty="0"/>
+              <a:t>i = </a:t>
+            </a:r>
+            <a:r>
+              <a:rPr lang="de-DE" dirty="0" err="1"/>
+              <a:t>n</a:t>
+            </a:r>
+            <a:r>
+              <a:rPr lang="de-DE" dirty="0"/>
+              <a:t> - </a:t>
+            </a:r>
+            <a:r>
+              <a:rPr lang="de-DE" dirty="0">
+                <a:solidFill>
+                  <a:srgbClr val="6897BB"/>
+                </a:solidFill>
+              </a:rPr>
+              <a:t>2</a:t>
+            </a:r>
+            <a:r>
+              <a:rPr lang="de-DE" dirty="0">
+                <a:solidFill>
+                  <a:srgbClr val="CC7832"/>
+                </a:solidFill>
+              </a:rPr>
+              <a:t>; </a:t>
+            </a:r>
+            <a:r>
+              <a:rPr lang="de-DE" dirty="0"/>
+              <a:t>i &gt;= </a:t>
+            </a:r>
+            <a:r>
+              <a:rPr lang="de-DE" dirty="0">
+                <a:solidFill>
+                  <a:srgbClr val="6897BB"/>
+                </a:solidFill>
+              </a:rPr>
+              <a:t>0</a:t>
+            </a:r>
+            <a:r>
+              <a:rPr lang="de-DE" dirty="0">
+                <a:solidFill>
+                  <a:srgbClr val="CC7832"/>
+                </a:solidFill>
+              </a:rPr>
+              <a:t>; </a:t>
+            </a:r>
+            <a:r>
+              <a:rPr lang="de-DE" dirty="0"/>
+              <a:t>i--) {</a:t>
+            </a:r>
+            <a:br>
+              <a:rPr lang="de-DE" dirty="0"/>
+            </a:br>
+            <a:r>
+              <a:rPr lang="de-DE" dirty="0"/>
+              <a:t>        s = </a:t>
+            </a:r>
+            <a:r>
+              <a:rPr lang="de-DE" dirty="0" err="1"/>
+              <a:t>s.multiply</a:t>
+            </a:r>
+            <a:r>
+              <a:rPr lang="de-DE" dirty="0"/>
+              <a:t>(s)</a:t>
+            </a:r>
+            <a:r>
+              <a:rPr lang="de-DE" dirty="0">
+                <a:solidFill>
+                  <a:srgbClr val="CC7832"/>
+                </a:solidFill>
+              </a:rPr>
+              <a:t>;</a:t>
+            </a:r>
+            <a:br>
+              <a:rPr lang="de-DE" dirty="0">
+                <a:solidFill>
+                  <a:srgbClr val="CC7832"/>
+                </a:solidFill>
+              </a:rPr>
+            </a:br>
+            <a:r>
+              <a:rPr lang="de-DE" dirty="0">
+                <a:solidFill>
+                  <a:srgbClr val="CC7832"/>
+                </a:solidFill>
+              </a:rPr>
+              <a:t>        </a:t>
+            </a:r>
+            <a:r>
+              <a:rPr lang="de-DE" dirty="0" err="1">
+                <a:solidFill>
+                  <a:srgbClr val="CC7832"/>
+                </a:solidFill>
+              </a:rPr>
+              <a:t>if</a:t>
+            </a:r>
+            <a:r>
+              <a:rPr lang="de-DE" dirty="0">
+                <a:solidFill>
+                  <a:srgbClr val="CC7832"/>
+                </a:solidFill>
+              </a:rPr>
+              <a:t> </a:t>
+            </a:r>
+            <a:r>
+              <a:rPr lang="de-DE" dirty="0"/>
+              <a:t>(</a:t>
+            </a:r>
+            <a:r>
+              <a:rPr lang="de-DE" dirty="0" err="1"/>
+              <a:t>e.testBit</a:t>
+            </a:r>
+            <a:r>
+              <a:rPr lang="de-DE" dirty="0"/>
+              <a:t>(i))</a:t>
+            </a:r>
+            <a:br>
+              <a:rPr lang="de-DE" dirty="0"/>
+            </a:br>
+            <a:r>
+              <a:rPr lang="de-DE" dirty="0"/>
+              <a:t>            s = </a:t>
+            </a:r>
+            <a:r>
+              <a:rPr lang="de-DE" dirty="0" err="1"/>
+              <a:t>s.multiply</a:t>
+            </a:r>
+            <a:r>
+              <a:rPr lang="de-DE" dirty="0"/>
+              <a:t>(</a:t>
+            </a:r>
+            <a:r>
+              <a:rPr lang="de-DE" dirty="0" err="1">
+                <a:solidFill>
+                  <a:srgbClr val="CC7832"/>
+                </a:solidFill>
+              </a:rPr>
+              <a:t>this</a:t>
+            </a:r>
+            <a:r>
+              <a:rPr lang="de-DE" dirty="0"/>
+              <a:t>)</a:t>
+            </a:r>
+            <a:r>
+              <a:rPr lang="de-DE" dirty="0">
+                <a:solidFill>
+                  <a:srgbClr val="CC7832"/>
+                </a:solidFill>
+              </a:rPr>
+              <a:t>;</a:t>
+            </a:r>
+            <a:br>
+              <a:rPr lang="de-DE" dirty="0">
+                <a:solidFill>
+                  <a:srgbClr val="CC7832"/>
+                </a:solidFill>
+              </a:rPr>
+            </a:br>
+            <a:r>
+              <a:rPr lang="de-DE" dirty="0">
+                <a:solidFill>
+                  <a:srgbClr val="CC7832"/>
+                </a:solidFill>
+              </a:rPr>
+              <a:t>    </a:t>
+            </a:r>
+            <a:r>
+              <a:rPr lang="de-DE" dirty="0"/>
+              <a:t>}</a:t>
+            </a:r>
+            <a:br>
+              <a:rPr lang="de-DE" dirty="0"/>
+            </a:br>
+            <a:br>
+              <a:rPr lang="de-DE" dirty="0"/>
+            </a:br>
+            <a:r>
+              <a:rPr lang="de-DE" dirty="0"/>
+              <a:t>    </a:t>
+            </a:r>
+            <a:r>
+              <a:rPr lang="de-DE" dirty="0" err="1">
+                <a:solidFill>
+                  <a:srgbClr val="CC7832"/>
+                </a:solidFill>
+              </a:rPr>
+              <a:t>return</a:t>
+            </a:r>
+            <a:r>
+              <a:rPr lang="de-DE" dirty="0">
+                <a:solidFill>
+                  <a:srgbClr val="CC7832"/>
+                </a:solidFill>
+              </a:rPr>
+              <a:t> </a:t>
+            </a:r>
+            <a:r>
+              <a:rPr lang="de-DE" dirty="0"/>
+              <a:t>s</a:t>
+            </a:r>
+            <a:r>
+              <a:rPr lang="de-DE" dirty="0">
+                <a:solidFill>
+                  <a:srgbClr val="CC7832"/>
+                </a:solidFill>
+              </a:rPr>
+              <a:t>;</a:t>
+            </a:r>
+            <a:br>
+              <a:rPr lang="de-DE" dirty="0">
+                <a:solidFill>
+                  <a:srgbClr val="CC7832"/>
+                </a:solidFill>
+              </a:rPr>
+            </a:br>
+            <a:r>
+              <a:rPr lang="de-DE" dirty="0"/>
+              <a:t>}</a:t>
+            </a:r>
+          </a:p>
+        </p:txBody>
+      </p:sp>
+    </p:spTree>
+    <p:extLst>
+      <p:ext uri="{BB962C8B-B14F-4D97-AF65-F5344CB8AC3E}">
+        <p14:creationId xmlns:p14="http://schemas.microsoft.com/office/powerpoint/2010/main" val="1862234181"/>
       </p:ext>
     </p:extLst>
   </p:cSld>

</xml_diff>

<commit_message>
Finished Presentation an minor formatting
</commit_message>
<xml_diff>
--- a/smallstepgiantstep/Elliptic Curve.pptx
+++ b/smallstepgiantstep/Elliptic Curve.pptx
@@ -14,6 +14,7 @@
     <p:sldId id="259" r:id="rId8"/>
     <p:sldId id="262" r:id="rId9"/>
     <p:sldId id="264" r:id="rId10"/>
+    <p:sldId id="265" r:id="rId11"/>
   </p:sldIdLst>
   <p:sldSz cx="12192000" cy="6858000"/>
   <p:notesSz cx="6858000" cy="9144000"/>
@@ -114,7 +115,7 @@
   </p:defaultTextStyle>
   <p:extLst>
     <p:ext uri="{EFAFB233-063F-42B5-8137-9DF3F51BA10A}">
-      <p15:sldGuideLst xmlns:p15="http://schemas.microsoft.com/office/powerpoint/2012/main"/>
+      <p15:sldGuideLst xmlns:p15="http://schemas.microsoft.com/office/powerpoint/2012/main" xmlns=""/>
     </p:ext>
   </p:extLst>
 </p:presentation>
@@ -142,7 +143,7 @@
           <p:cNvPr id="2" name="Title 1">
             <a:extLst>
               <a:ext uri="{FF2B5EF4-FFF2-40B4-BE49-F238E27FC236}">
-                <a16:creationId xmlns:a16="http://schemas.microsoft.com/office/drawing/2014/main" id="{B3496638-2B0B-6840-9FB1-1D4C4792CD05}"/>
+                <a16:creationId xmlns:a16="http://schemas.microsoft.com/office/drawing/2014/main" xmlns="" id="{B3496638-2B0B-6840-9FB1-1D4C4792CD05}"/>
               </a:ext>
             </a:extLst>
           </p:cNvPr>
@@ -180,7 +181,7 @@
           <p:cNvPr id="3" name="Subtitle 2">
             <a:extLst>
               <a:ext uri="{FF2B5EF4-FFF2-40B4-BE49-F238E27FC236}">
-                <a16:creationId xmlns:a16="http://schemas.microsoft.com/office/drawing/2014/main" id="{4AAE1C29-4496-EC43-954A-B7E72C3D09F5}"/>
+                <a16:creationId xmlns:a16="http://schemas.microsoft.com/office/drawing/2014/main" xmlns="" id="{4AAE1C29-4496-EC43-954A-B7E72C3D09F5}"/>
               </a:ext>
             </a:extLst>
           </p:cNvPr>
@@ -251,7 +252,7 @@
           <p:cNvPr id="4" name="Date Placeholder 3">
             <a:extLst>
               <a:ext uri="{FF2B5EF4-FFF2-40B4-BE49-F238E27FC236}">
-                <a16:creationId xmlns:a16="http://schemas.microsoft.com/office/drawing/2014/main" id="{95B6D35C-B50F-7C4D-9331-74299545C597}"/>
+                <a16:creationId xmlns:a16="http://schemas.microsoft.com/office/drawing/2014/main" xmlns="" id="{95B6D35C-B50F-7C4D-9331-74299545C597}"/>
               </a:ext>
             </a:extLst>
           </p:cNvPr>
@@ -269,7 +270,7 @@
           <a:p>
             <a:fld id="{4AAF318C-B15B-B14A-B88E-D91B1F600C11}" type="datetimeFigureOut">
               <a:rPr lang="de-DE" smtClean="0"/>
-              <a:t>09.01.19</a:t>
+              <a:t>12.01.19</a:t>
             </a:fld>
             <a:endParaRPr lang="de-DE"/>
           </a:p>
@@ -280,7 +281,7 @@
           <p:cNvPr id="5" name="Footer Placeholder 4">
             <a:extLst>
               <a:ext uri="{FF2B5EF4-FFF2-40B4-BE49-F238E27FC236}">
-                <a16:creationId xmlns:a16="http://schemas.microsoft.com/office/drawing/2014/main" id="{35C7242B-8A0F-1442-9221-2C24B4FDDBFC}"/>
+                <a16:creationId xmlns:a16="http://schemas.microsoft.com/office/drawing/2014/main" xmlns="" id="{35C7242B-8A0F-1442-9221-2C24B4FDDBFC}"/>
               </a:ext>
             </a:extLst>
           </p:cNvPr>
@@ -305,7 +306,7 @@
           <p:cNvPr id="6" name="Slide Number Placeholder 5">
             <a:extLst>
               <a:ext uri="{FF2B5EF4-FFF2-40B4-BE49-F238E27FC236}">
-                <a16:creationId xmlns:a16="http://schemas.microsoft.com/office/drawing/2014/main" id="{FD002E67-DF3C-784E-8FBD-D93F5B2A9393}"/>
+                <a16:creationId xmlns:a16="http://schemas.microsoft.com/office/drawing/2014/main" xmlns="" id="{FD002E67-DF3C-784E-8FBD-D93F5B2A9393}"/>
               </a:ext>
             </a:extLst>
           </p:cNvPr>
@@ -323,7 +324,7 @@
           <a:p>
             <a:fld id="{27776172-C73E-4E46-890D-D4E8EEFE01EB}" type="slidenum">
               <a:rPr lang="de-DE" smtClean="0"/>
-              <a:t>‹#›</a:t>
+              <a:t>‹Nr.›</a:t>
             </a:fld>
             <a:endParaRPr lang="de-DE"/>
           </a:p>
@@ -364,7 +365,7 @@
           <p:cNvPr id="2" name="Title 1">
             <a:extLst>
               <a:ext uri="{FF2B5EF4-FFF2-40B4-BE49-F238E27FC236}">
-                <a16:creationId xmlns:a16="http://schemas.microsoft.com/office/drawing/2014/main" id="{786784B4-B5A0-2149-A739-5A7F11C3B326}"/>
+                <a16:creationId xmlns:a16="http://schemas.microsoft.com/office/drawing/2014/main" xmlns="" id="{786784B4-B5A0-2149-A739-5A7F11C3B326}"/>
               </a:ext>
             </a:extLst>
           </p:cNvPr>
@@ -393,7 +394,7 @@
           <p:cNvPr id="3" name="Vertical Text Placeholder 2">
             <a:extLst>
               <a:ext uri="{FF2B5EF4-FFF2-40B4-BE49-F238E27FC236}">
-                <a16:creationId xmlns:a16="http://schemas.microsoft.com/office/drawing/2014/main" id="{4F2C0A1F-3ED3-A942-97E3-EBF1BDFEFFFB}"/>
+                <a16:creationId xmlns:a16="http://schemas.microsoft.com/office/drawing/2014/main" xmlns="" id="{4F2C0A1F-3ED3-A942-97E3-EBF1BDFEFFFB}"/>
               </a:ext>
             </a:extLst>
           </p:cNvPr>
@@ -451,7 +452,7 @@
           <p:cNvPr id="4" name="Date Placeholder 3">
             <a:extLst>
               <a:ext uri="{FF2B5EF4-FFF2-40B4-BE49-F238E27FC236}">
-                <a16:creationId xmlns:a16="http://schemas.microsoft.com/office/drawing/2014/main" id="{199C0076-1309-5044-ACD3-522BDB5F18DC}"/>
+                <a16:creationId xmlns:a16="http://schemas.microsoft.com/office/drawing/2014/main" xmlns="" id="{199C0076-1309-5044-ACD3-522BDB5F18DC}"/>
               </a:ext>
             </a:extLst>
           </p:cNvPr>
@@ -469,7 +470,7 @@
           <a:p>
             <a:fld id="{4AAF318C-B15B-B14A-B88E-D91B1F600C11}" type="datetimeFigureOut">
               <a:rPr lang="de-DE" smtClean="0"/>
-              <a:t>09.01.19</a:t>
+              <a:t>12.01.19</a:t>
             </a:fld>
             <a:endParaRPr lang="de-DE"/>
           </a:p>
@@ -480,7 +481,7 @@
           <p:cNvPr id="5" name="Footer Placeholder 4">
             <a:extLst>
               <a:ext uri="{FF2B5EF4-FFF2-40B4-BE49-F238E27FC236}">
-                <a16:creationId xmlns:a16="http://schemas.microsoft.com/office/drawing/2014/main" id="{6227CF94-9179-844E-92AB-2057C1B8BA54}"/>
+                <a16:creationId xmlns:a16="http://schemas.microsoft.com/office/drawing/2014/main" xmlns="" id="{6227CF94-9179-844E-92AB-2057C1B8BA54}"/>
               </a:ext>
             </a:extLst>
           </p:cNvPr>
@@ -505,7 +506,7 @@
           <p:cNvPr id="6" name="Slide Number Placeholder 5">
             <a:extLst>
               <a:ext uri="{FF2B5EF4-FFF2-40B4-BE49-F238E27FC236}">
-                <a16:creationId xmlns:a16="http://schemas.microsoft.com/office/drawing/2014/main" id="{D247854E-78F7-A842-BC1D-E617F1FA3A00}"/>
+                <a16:creationId xmlns:a16="http://schemas.microsoft.com/office/drawing/2014/main" xmlns="" id="{D247854E-78F7-A842-BC1D-E617F1FA3A00}"/>
               </a:ext>
             </a:extLst>
           </p:cNvPr>
@@ -523,7 +524,7 @@
           <a:p>
             <a:fld id="{27776172-C73E-4E46-890D-D4E8EEFE01EB}" type="slidenum">
               <a:rPr lang="de-DE" smtClean="0"/>
-              <a:t>‹#›</a:t>
+              <a:t>‹Nr.›</a:t>
             </a:fld>
             <a:endParaRPr lang="de-DE"/>
           </a:p>
@@ -564,7 +565,7 @@
           <p:cNvPr id="2" name="Vertical Title 1">
             <a:extLst>
               <a:ext uri="{FF2B5EF4-FFF2-40B4-BE49-F238E27FC236}">
-                <a16:creationId xmlns:a16="http://schemas.microsoft.com/office/drawing/2014/main" id="{C0386928-C77B-FD4A-BCDF-08FDB8098A7C}"/>
+                <a16:creationId xmlns:a16="http://schemas.microsoft.com/office/drawing/2014/main" xmlns="" id="{C0386928-C77B-FD4A-BCDF-08FDB8098A7C}"/>
               </a:ext>
             </a:extLst>
           </p:cNvPr>
@@ -598,7 +599,7 @@
           <p:cNvPr id="3" name="Vertical Text Placeholder 2">
             <a:extLst>
               <a:ext uri="{FF2B5EF4-FFF2-40B4-BE49-F238E27FC236}">
-                <a16:creationId xmlns:a16="http://schemas.microsoft.com/office/drawing/2014/main" id="{EBB99B72-43B8-A44D-AE2A-56736A5BD2B1}"/>
+                <a16:creationId xmlns:a16="http://schemas.microsoft.com/office/drawing/2014/main" xmlns="" id="{EBB99B72-43B8-A44D-AE2A-56736A5BD2B1}"/>
               </a:ext>
             </a:extLst>
           </p:cNvPr>
@@ -661,7 +662,7 @@
           <p:cNvPr id="4" name="Date Placeholder 3">
             <a:extLst>
               <a:ext uri="{FF2B5EF4-FFF2-40B4-BE49-F238E27FC236}">
-                <a16:creationId xmlns:a16="http://schemas.microsoft.com/office/drawing/2014/main" id="{5EE2533D-6D6D-5E48-9439-4D1E5C509ACB}"/>
+                <a16:creationId xmlns:a16="http://schemas.microsoft.com/office/drawing/2014/main" xmlns="" id="{5EE2533D-6D6D-5E48-9439-4D1E5C509ACB}"/>
               </a:ext>
             </a:extLst>
           </p:cNvPr>
@@ -679,7 +680,7 @@
           <a:p>
             <a:fld id="{4AAF318C-B15B-B14A-B88E-D91B1F600C11}" type="datetimeFigureOut">
               <a:rPr lang="de-DE" smtClean="0"/>
-              <a:t>09.01.19</a:t>
+              <a:t>12.01.19</a:t>
             </a:fld>
             <a:endParaRPr lang="de-DE"/>
           </a:p>
@@ -690,7 +691,7 @@
           <p:cNvPr id="5" name="Footer Placeholder 4">
             <a:extLst>
               <a:ext uri="{FF2B5EF4-FFF2-40B4-BE49-F238E27FC236}">
-                <a16:creationId xmlns:a16="http://schemas.microsoft.com/office/drawing/2014/main" id="{1D3C2533-C9B0-FD40-A519-B3B814486AB2}"/>
+                <a16:creationId xmlns:a16="http://schemas.microsoft.com/office/drawing/2014/main" xmlns="" id="{1D3C2533-C9B0-FD40-A519-B3B814486AB2}"/>
               </a:ext>
             </a:extLst>
           </p:cNvPr>
@@ -715,7 +716,7 @@
           <p:cNvPr id="6" name="Slide Number Placeholder 5">
             <a:extLst>
               <a:ext uri="{FF2B5EF4-FFF2-40B4-BE49-F238E27FC236}">
-                <a16:creationId xmlns:a16="http://schemas.microsoft.com/office/drawing/2014/main" id="{FD25BE13-C065-B04C-A4C2-D513BD831AF5}"/>
+                <a16:creationId xmlns:a16="http://schemas.microsoft.com/office/drawing/2014/main" xmlns="" id="{FD25BE13-C065-B04C-A4C2-D513BD831AF5}"/>
               </a:ext>
             </a:extLst>
           </p:cNvPr>
@@ -733,7 +734,7 @@
           <a:p>
             <a:fld id="{27776172-C73E-4E46-890D-D4E8EEFE01EB}" type="slidenum">
               <a:rPr lang="de-DE" smtClean="0"/>
-              <a:t>‹#›</a:t>
+              <a:t>‹Nr.›</a:t>
             </a:fld>
             <a:endParaRPr lang="de-DE"/>
           </a:p>
@@ -774,7 +775,7 @@
           <p:cNvPr id="2" name="Title 1">
             <a:extLst>
               <a:ext uri="{FF2B5EF4-FFF2-40B4-BE49-F238E27FC236}">
-                <a16:creationId xmlns:a16="http://schemas.microsoft.com/office/drawing/2014/main" id="{51843B4F-85FF-7C4D-9B40-07C1604E363F}"/>
+                <a16:creationId xmlns:a16="http://schemas.microsoft.com/office/drawing/2014/main" xmlns="" id="{51843B4F-85FF-7C4D-9B40-07C1604E363F}"/>
               </a:ext>
             </a:extLst>
           </p:cNvPr>
@@ -803,7 +804,7 @@
           <p:cNvPr id="3" name="Content Placeholder 2">
             <a:extLst>
               <a:ext uri="{FF2B5EF4-FFF2-40B4-BE49-F238E27FC236}">
-                <a16:creationId xmlns:a16="http://schemas.microsoft.com/office/drawing/2014/main" id="{C9F11A04-A644-9549-BB07-700927B035DB}"/>
+                <a16:creationId xmlns:a16="http://schemas.microsoft.com/office/drawing/2014/main" xmlns="" id="{C9F11A04-A644-9549-BB07-700927B035DB}"/>
               </a:ext>
             </a:extLst>
           </p:cNvPr>
@@ -861,7 +862,7 @@
           <p:cNvPr id="4" name="Date Placeholder 3">
             <a:extLst>
               <a:ext uri="{FF2B5EF4-FFF2-40B4-BE49-F238E27FC236}">
-                <a16:creationId xmlns:a16="http://schemas.microsoft.com/office/drawing/2014/main" id="{F67B27D4-4EC1-8346-8C94-623A95CF4872}"/>
+                <a16:creationId xmlns:a16="http://schemas.microsoft.com/office/drawing/2014/main" xmlns="" id="{F67B27D4-4EC1-8346-8C94-623A95CF4872}"/>
               </a:ext>
             </a:extLst>
           </p:cNvPr>
@@ -879,7 +880,7 @@
           <a:p>
             <a:fld id="{4AAF318C-B15B-B14A-B88E-D91B1F600C11}" type="datetimeFigureOut">
               <a:rPr lang="de-DE" smtClean="0"/>
-              <a:t>09.01.19</a:t>
+              <a:t>12.01.19</a:t>
             </a:fld>
             <a:endParaRPr lang="de-DE"/>
           </a:p>
@@ -890,7 +891,7 @@
           <p:cNvPr id="5" name="Footer Placeholder 4">
             <a:extLst>
               <a:ext uri="{FF2B5EF4-FFF2-40B4-BE49-F238E27FC236}">
-                <a16:creationId xmlns:a16="http://schemas.microsoft.com/office/drawing/2014/main" id="{AB4A72C8-BEAE-6749-9F1A-AB751EFA1E38}"/>
+                <a16:creationId xmlns:a16="http://schemas.microsoft.com/office/drawing/2014/main" xmlns="" id="{AB4A72C8-BEAE-6749-9F1A-AB751EFA1E38}"/>
               </a:ext>
             </a:extLst>
           </p:cNvPr>
@@ -915,7 +916,7 @@
           <p:cNvPr id="6" name="Slide Number Placeholder 5">
             <a:extLst>
               <a:ext uri="{FF2B5EF4-FFF2-40B4-BE49-F238E27FC236}">
-                <a16:creationId xmlns:a16="http://schemas.microsoft.com/office/drawing/2014/main" id="{1C9BCE4C-F94D-E44A-B139-39A95555186C}"/>
+                <a16:creationId xmlns:a16="http://schemas.microsoft.com/office/drawing/2014/main" xmlns="" id="{1C9BCE4C-F94D-E44A-B139-39A95555186C}"/>
               </a:ext>
             </a:extLst>
           </p:cNvPr>
@@ -933,7 +934,7 @@
           <a:p>
             <a:fld id="{27776172-C73E-4E46-890D-D4E8EEFE01EB}" type="slidenum">
               <a:rPr lang="de-DE" smtClean="0"/>
-              <a:t>‹#›</a:t>
+              <a:t>‹Nr.›</a:t>
             </a:fld>
             <a:endParaRPr lang="de-DE"/>
           </a:p>
@@ -974,7 +975,7 @@
           <p:cNvPr id="2" name="Title 1">
             <a:extLst>
               <a:ext uri="{FF2B5EF4-FFF2-40B4-BE49-F238E27FC236}">
-                <a16:creationId xmlns:a16="http://schemas.microsoft.com/office/drawing/2014/main" id="{82836F2B-5111-1B41-8843-F6DBD6C067D5}"/>
+                <a16:creationId xmlns:a16="http://schemas.microsoft.com/office/drawing/2014/main" xmlns="" id="{82836F2B-5111-1B41-8843-F6DBD6C067D5}"/>
               </a:ext>
             </a:extLst>
           </p:cNvPr>
@@ -1012,7 +1013,7 @@
           <p:cNvPr id="3" name="Text Placeholder 2">
             <a:extLst>
               <a:ext uri="{FF2B5EF4-FFF2-40B4-BE49-F238E27FC236}">
-                <a16:creationId xmlns:a16="http://schemas.microsoft.com/office/drawing/2014/main" id="{5804D2F6-5093-FB41-BE0D-DCC4B1343CAC}"/>
+                <a16:creationId xmlns:a16="http://schemas.microsoft.com/office/drawing/2014/main" xmlns="" id="{5804D2F6-5093-FB41-BE0D-DCC4B1343CAC}"/>
               </a:ext>
             </a:extLst>
           </p:cNvPr>
@@ -1137,7 +1138,7 @@
           <p:cNvPr id="4" name="Date Placeholder 3">
             <a:extLst>
               <a:ext uri="{FF2B5EF4-FFF2-40B4-BE49-F238E27FC236}">
-                <a16:creationId xmlns:a16="http://schemas.microsoft.com/office/drawing/2014/main" id="{F5DBBA89-5C86-4B41-A5FE-DC80BF9FAB66}"/>
+                <a16:creationId xmlns:a16="http://schemas.microsoft.com/office/drawing/2014/main" xmlns="" id="{F5DBBA89-5C86-4B41-A5FE-DC80BF9FAB66}"/>
               </a:ext>
             </a:extLst>
           </p:cNvPr>
@@ -1155,7 +1156,7 @@
           <a:p>
             <a:fld id="{4AAF318C-B15B-B14A-B88E-D91B1F600C11}" type="datetimeFigureOut">
               <a:rPr lang="de-DE" smtClean="0"/>
-              <a:t>09.01.19</a:t>
+              <a:t>12.01.19</a:t>
             </a:fld>
             <a:endParaRPr lang="de-DE"/>
           </a:p>
@@ -1166,7 +1167,7 @@
           <p:cNvPr id="5" name="Footer Placeholder 4">
             <a:extLst>
               <a:ext uri="{FF2B5EF4-FFF2-40B4-BE49-F238E27FC236}">
-                <a16:creationId xmlns:a16="http://schemas.microsoft.com/office/drawing/2014/main" id="{4CF43058-1592-2A4F-BBAC-9EE98276DD08}"/>
+                <a16:creationId xmlns:a16="http://schemas.microsoft.com/office/drawing/2014/main" xmlns="" id="{4CF43058-1592-2A4F-BBAC-9EE98276DD08}"/>
               </a:ext>
             </a:extLst>
           </p:cNvPr>
@@ -1191,7 +1192,7 @@
           <p:cNvPr id="6" name="Slide Number Placeholder 5">
             <a:extLst>
               <a:ext uri="{FF2B5EF4-FFF2-40B4-BE49-F238E27FC236}">
-                <a16:creationId xmlns:a16="http://schemas.microsoft.com/office/drawing/2014/main" id="{C99ECB04-1D4F-F14D-B825-96E5593AC2AB}"/>
+                <a16:creationId xmlns:a16="http://schemas.microsoft.com/office/drawing/2014/main" xmlns="" id="{C99ECB04-1D4F-F14D-B825-96E5593AC2AB}"/>
               </a:ext>
             </a:extLst>
           </p:cNvPr>
@@ -1209,7 +1210,7 @@
           <a:p>
             <a:fld id="{27776172-C73E-4E46-890D-D4E8EEFE01EB}" type="slidenum">
               <a:rPr lang="de-DE" smtClean="0"/>
-              <a:t>‹#›</a:t>
+              <a:t>‹Nr.›</a:t>
             </a:fld>
             <a:endParaRPr lang="de-DE"/>
           </a:p>
@@ -1250,7 +1251,7 @@
           <p:cNvPr id="2" name="Title 1">
             <a:extLst>
               <a:ext uri="{FF2B5EF4-FFF2-40B4-BE49-F238E27FC236}">
-                <a16:creationId xmlns:a16="http://schemas.microsoft.com/office/drawing/2014/main" id="{68B06189-2A49-8640-92CE-3D0085F38801}"/>
+                <a16:creationId xmlns:a16="http://schemas.microsoft.com/office/drawing/2014/main" xmlns="" id="{68B06189-2A49-8640-92CE-3D0085F38801}"/>
               </a:ext>
             </a:extLst>
           </p:cNvPr>
@@ -1279,7 +1280,7 @@
           <p:cNvPr id="3" name="Content Placeholder 2">
             <a:extLst>
               <a:ext uri="{FF2B5EF4-FFF2-40B4-BE49-F238E27FC236}">
-                <a16:creationId xmlns:a16="http://schemas.microsoft.com/office/drawing/2014/main" id="{B7005434-D6C6-804B-A852-0C86ACC2227D}"/>
+                <a16:creationId xmlns:a16="http://schemas.microsoft.com/office/drawing/2014/main" xmlns="" id="{B7005434-D6C6-804B-A852-0C86ACC2227D}"/>
               </a:ext>
             </a:extLst>
           </p:cNvPr>
@@ -1342,7 +1343,7 @@
           <p:cNvPr id="4" name="Content Placeholder 3">
             <a:extLst>
               <a:ext uri="{FF2B5EF4-FFF2-40B4-BE49-F238E27FC236}">
-                <a16:creationId xmlns:a16="http://schemas.microsoft.com/office/drawing/2014/main" id="{29A8E03D-E6B0-5B45-8563-9DDB5B45D288}"/>
+                <a16:creationId xmlns:a16="http://schemas.microsoft.com/office/drawing/2014/main" xmlns="" id="{29A8E03D-E6B0-5B45-8563-9DDB5B45D288}"/>
               </a:ext>
             </a:extLst>
           </p:cNvPr>
@@ -1405,7 +1406,7 @@
           <p:cNvPr id="5" name="Date Placeholder 4">
             <a:extLst>
               <a:ext uri="{FF2B5EF4-FFF2-40B4-BE49-F238E27FC236}">
-                <a16:creationId xmlns:a16="http://schemas.microsoft.com/office/drawing/2014/main" id="{E6BD38A8-962F-4E4B-BB0B-A6C39B654F80}"/>
+                <a16:creationId xmlns:a16="http://schemas.microsoft.com/office/drawing/2014/main" xmlns="" id="{E6BD38A8-962F-4E4B-BB0B-A6C39B654F80}"/>
               </a:ext>
             </a:extLst>
           </p:cNvPr>
@@ -1423,7 +1424,7 @@
           <a:p>
             <a:fld id="{4AAF318C-B15B-B14A-B88E-D91B1F600C11}" type="datetimeFigureOut">
               <a:rPr lang="de-DE" smtClean="0"/>
-              <a:t>09.01.19</a:t>
+              <a:t>12.01.19</a:t>
             </a:fld>
             <a:endParaRPr lang="de-DE"/>
           </a:p>
@@ -1434,7 +1435,7 @@
           <p:cNvPr id="6" name="Footer Placeholder 5">
             <a:extLst>
               <a:ext uri="{FF2B5EF4-FFF2-40B4-BE49-F238E27FC236}">
-                <a16:creationId xmlns:a16="http://schemas.microsoft.com/office/drawing/2014/main" id="{605FD32B-D327-0841-A5DB-5ED1178220C6}"/>
+                <a16:creationId xmlns:a16="http://schemas.microsoft.com/office/drawing/2014/main" xmlns="" id="{605FD32B-D327-0841-A5DB-5ED1178220C6}"/>
               </a:ext>
             </a:extLst>
           </p:cNvPr>
@@ -1459,7 +1460,7 @@
           <p:cNvPr id="7" name="Slide Number Placeholder 6">
             <a:extLst>
               <a:ext uri="{FF2B5EF4-FFF2-40B4-BE49-F238E27FC236}">
-                <a16:creationId xmlns:a16="http://schemas.microsoft.com/office/drawing/2014/main" id="{DAFA7783-933D-0D4C-9D92-B44D0966277E}"/>
+                <a16:creationId xmlns:a16="http://schemas.microsoft.com/office/drawing/2014/main" xmlns="" id="{DAFA7783-933D-0D4C-9D92-B44D0966277E}"/>
               </a:ext>
             </a:extLst>
           </p:cNvPr>
@@ -1477,7 +1478,7 @@
           <a:p>
             <a:fld id="{27776172-C73E-4E46-890D-D4E8EEFE01EB}" type="slidenum">
               <a:rPr lang="de-DE" smtClean="0"/>
-              <a:t>‹#›</a:t>
+              <a:t>‹Nr.›</a:t>
             </a:fld>
             <a:endParaRPr lang="de-DE"/>
           </a:p>
@@ -1518,7 +1519,7 @@
           <p:cNvPr id="2" name="Title 1">
             <a:extLst>
               <a:ext uri="{FF2B5EF4-FFF2-40B4-BE49-F238E27FC236}">
-                <a16:creationId xmlns:a16="http://schemas.microsoft.com/office/drawing/2014/main" id="{7968562C-2EDF-DF42-BB93-DF7EFC4201DA}"/>
+                <a16:creationId xmlns:a16="http://schemas.microsoft.com/office/drawing/2014/main" xmlns="" id="{7968562C-2EDF-DF42-BB93-DF7EFC4201DA}"/>
               </a:ext>
             </a:extLst>
           </p:cNvPr>
@@ -1552,7 +1553,7 @@
           <p:cNvPr id="3" name="Text Placeholder 2">
             <a:extLst>
               <a:ext uri="{FF2B5EF4-FFF2-40B4-BE49-F238E27FC236}">
-                <a16:creationId xmlns:a16="http://schemas.microsoft.com/office/drawing/2014/main" id="{B272F68D-8924-0741-B8D0-B680112467F1}"/>
+                <a16:creationId xmlns:a16="http://schemas.microsoft.com/office/drawing/2014/main" xmlns="" id="{B272F68D-8924-0741-B8D0-B680112467F1}"/>
               </a:ext>
             </a:extLst>
           </p:cNvPr>
@@ -1623,7 +1624,7 @@
           <p:cNvPr id="4" name="Content Placeholder 3">
             <a:extLst>
               <a:ext uri="{FF2B5EF4-FFF2-40B4-BE49-F238E27FC236}">
-                <a16:creationId xmlns:a16="http://schemas.microsoft.com/office/drawing/2014/main" id="{30DB250B-7966-284B-8AD9-E38C3B63BF9F}"/>
+                <a16:creationId xmlns:a16="http://schemas.microsoft.com/office/drawing/2014/main" xmlns="" id="{30DB250B-7966-284B-8AD9-E38C3B63BF9F}"/>
               </a:ext>
             </a:extLst>
           </p:cNvPr>
@@ -1686,7 +1687,7 @@
           <p:cNvPr id="5" name="Text Placeholder 4">
             <a:extLst>
               <a:ext uri="{FF2B5EF4-FFF2-40B4-BE49-F238E27FC236}">
-                <a16:creationId xmlns:a16="http://schemas.microsoft.com/office/drawing/2014/main" id="{5C22FE6C-E51A-894C-8032-4E31B7FF4B69}"/>
+                <a16:creationId xmlns:a16="http://schemas.microsoft.com/office/drawing/2014/main" xmlns="" id="{5C22FE6C-E51A-894C-8032-4E31B7FF4B69}"/>
               </a:ext>
             </a:extLst>
           </p:cNvPr>
@@ -1757,7 +1758,7 @@
           <p:cNvPr id="6" name="Content Placeholder 5">
             <a:extLst>
               <a:ext uri="{FF2B5EF4-FFF2-40B4-BE49-F238E27FC236}">
-                <a16:creationId xmlns:a16="http://schemas.microsoft.com/office/drawing/2014/main" id="{F657F720-86D3-C44A-8E08-5B1910FFF65D}"/>
+                <a16:creationId xmlns:a16="http://schemas.microsoft.com/office/drawing/2014/main" xmlns="" id="{F657F720-86D3-C44A-8E08-5B1910FFF65D}"/>
               </a:ext>
             </a:extLst>
           </p:cNvPr>
@@ -1820,7 +1821,7 @@
           <p:cNvPr id="7" name="Date Placeholder 6">
             <a:extLst>
               <a:ext uri="{FF2B5EF4-FFF2-40B4-BE49-F238E27FC236}">
-                <a16:creationId xmlns:a16="http://schemas.microsoft.com/office/drawing/2014/main" id="{BD98E581-A950-F843-B283-2F704E864420}"/>
+                <a16:creationId xmlns:a16="http://schemas.microsoft.com/office/drawing/2014/main" xmlns="" id="{BD98E581-A950-F843-B283-2F704E864420}"/>
               </a:ext>
             </a:extLst>
           </p:cNvPr>
@@ -1838,7 +1839,7 @@
           <a:p>
             <a:fld id="{4AAF318C-B15B-B14A-B88E-D91B1F600C11}" type="datetimeFigureOut">
               <a:rPr lang="de-DE" smtClean="0"/>
-              <a:t>09.01.19</a:t>
+              <a:t>12.01.19</a:t>
             </a:fld>
             <a:endParaRPr lang="de-DE"/>
           </a:p>
@@ -1849,7 +1850,7 @@
           <p:cNvPr id="8" name="Footer Placeholder 7">
             <a:extLst>
               <a:ext uri="{FF2B5EF4-FFF2-40B4-BE49-F238E27FC236}">
-                <a16:creationId xmlns:a16="http://schemas.microsoft.com/office/drawing/2014/main" id="{3940C232-422F-CF45-9254-AE99390D7C4A}"/>
+                <a16:creationId xmlns:a16="http://schemas.microsoft.com/office/drawing/2014/main" xmlns="" id="{3940C232-422F-CF45-9254-AE99390D7C4A}"/>
               </a:ext>
             </a:extLst>
           </p:cNvPr>
@@ -1874,7 +1875,7 @@
           <p:cNvPr id="9" name="Slide Number Placeholder 8">
             <a:extLst>
               <a:ext uri="{FF2B5EF4-FFF2-40B4-BE49-F238E27FC236}">
-                <a16:creationId xmlns:a16="http://schemas.microsoft.com/office/drawing/2014/main" id="{8C8BCA7D-FDF8-2948-B94B-C2248AB7AD4A}"/>
+                <a16:creationId xmlns:a16="http://schemas.microsoft.com/office/drawing/2014/main" xmlns="" id="{8C8BCA7D-FDF8-2948-B94B-C2248AB7AD4A}"/>
               </a:ext>
             </a:extLst>
           </p:cNvPr>
@@ -1892,7 +1893,7 @@
           <a:p>
             <a:fld id="{27776172-C73E-4E46-890D-D4E8EEFE01EB}" type="slidenum">
               <a:rPr lang="de-DE" smtClean="0"/>
-              <a:t>‹#›</a:t>
+              <a:t>‹Nr.›</a:t>
             </a:fld>
             <a:endParaRPr lang="de-DE"/>
           </a:p>
@@ -1933,7 +1934,7 @@
           <p:cNvPr id="2" name="Title 1">
             <a:extLst>
               <a:ext uri="{FF2B5EF4-FFF2-40B4-BE49-F238E27FC236}">
-                <a16:creationId xmlns:a16="http://schemas.microsoft.com/office/drawing/2014/main" id="{45B271BB-8AE3-C749-AAE7-75991D455A1D}"/>
+                <a16:creationId xmlns:a16="http://schemas.microsoft.com/office/drawing/2014/main" xmlns="" id="{45B271BB-8AE3-C749-AAE7-75991D455A1D}"/>
               </a:ext>
             </a:extLst>
           </p:cNvPr>
@@ -1962,7 +1963,7 @@
           <p:cNvPr id="3" name="Date Placeholder 2">
             <a:extLst>
               <a:ext uri="{FF2B5EF4-FFF2-40B4-BE49-F238E27FC236}">
-                <a16:creationId xmlns:a16="http://schemas.microsoft.com/office/drawing/2014/main" id="{83090576-FD39-8B45-BA62-68DC77AF497D}"/>
+                <a16:creationId xmlns:a16="http://schemas.microsoft.com/office/drawing/2014/main" xmlns="" id="{83090576-FD39-8B45-BA62-68DC77AF497D}"/>
               </a:ext>
             </a:extLst>
           </p:cNvPr>
@@ -1980,7 +1981,7 @@
           <a:p>
             <a:fld id="{4AAF318C-B15B-B14A-B88E-D91B1F600C11}" type="datetimeFigureOut">
               <a:rPr lang="de-DE" smtClean="0"/>
-              <a:t>09.01.19</a:t>
+              <a:t>12.01.19</a:t>
             </a:fld>
             <a:endParaRPr lang="de-DE"/>
           </a:p>
@@ -1991,7 +1992,7 @@
           <p:cNvPr id="4" name="Footer Placeholder 3">
             <a:extLst>
               <a:ext uri="{FF2B5EF4-FFF2-40B4-BE49-F238E27FC236}">
-                <a16:creationId xmlns:a16="http://schemas.microsoft.com/office/drawing/2014/main" id="{046AB534-5417-5041-B003-58730E9C1408}"/>
+                <a16:creationId xmlns:a16="http://schemas.microsoft.com/office/drawing/2014/main" xmlns="" id="{046AB534-5417-5041-B003-58730E9C1408}"/>
               </a:ext>
             </a:extLst>
           </p:cNvPr>
@@ -2016,7 +2017,7 @@
           <p:cNvPr id="5" name="Slide Number Placeholder 4">
             <a:extLst>
               <a:ext uri="{FF2B5EF4-FFF2-40B4-BE49-F238E27FC236}">
-                <a16:creationId xmlns:a16="http://schemas.microsoft.com/office/drawing/2014/main" id="{03F5C6A4-871C-BF44-BD6A-A6F04DE215C5}"/>
+                <a16:creationId xmlns:a16="http://schemas.microsoft.com/office/drawing/2014/main" xmlns="" id="{03F5C6A4-871C-BF44-BD6A-A6F04DE215C5}"/>
               </a:ext>
             </a:extLst>
           </p:cNvPr>
@@ -2034,7 +2035,7 @@
           <a:p>
             <a:fld id="{27776172-C73E-4E46-890D-D4E8EEFE01EB}" type="slidenum">
               <a:rPr lang="de-DE" smtClean="0"/>
-              <a:t>‹#›</a:t>
+              <a:t>‹Nr.›</a:t>
             </a:fld>
             <a:endParaRPr lang="de-DE"/>
           </a:p>
@@ -2075,7 +2076,7 @@
           <p:cNvPr id="2" name="Date Placeholder 1">
             <a:extLst>
               <a:ext uri="{FF2B5EF4-FFF2-40B4-BE49-F238E27FC236}">
-                <a16:creationId xmlns:a16="http://schemas.microsoft.com/office/drawing/2014/main" id="{1CB1EA69-0920-424F-B71D-76CF794C578D}"/>
+                <a16:creationId xmlns:a16="http://schemas.microsoft.com/office/drawing/2014/main" xmlns="" id="{1CB1EA69-0920-424F-B71D-76CF794C578D}"/>
               </a:ext>
             </a:extLst>
           </p:cNvPr>
@@ -2093,7 +2094,7 @@
           <a:p>
             <a:fld id="{4AAF318C-B15B-B14A-B88E-D91B1F600C11}" type="datetimeFigureOut">
               <a:rPr lang="de-DE" smtClean="0"/>
-              <a:t>09.01.19</a:t>
+              <a:t>12.01.19</a:t>
             </a:fld>
             <a:endParaRPr lang="de-DE"/>
           </a:p>
@@ -2104,7 +2105,7 @@
           <p:cNvPr id="3" name="Footer Placeholder 2">
             <a:extLst>
               <a:ext uri="{FF2B5EF4-FFF2-40B4-BE49-F238E27FC236}">
-                <a16:creationId xmlns:a16="http://schemas.microsoft.com/office/drawing/2014/main" id="{591C5A27-E0D2-E74E-AE42-4A7754FD39F0}"/>
+                <a16:creationId xmlns:a16="http://schemas.microsoft.com/office/drawing/2014/main" xmlns="" id="{591C5A27-E0D2-E74E-AE42-4A7754FD39F0}"/>
               </a:ext>
             </a:extLst>
           </p:cNvPr>
@@ -2129,7 +2130,7 @@
           <p:cNvPr id="4" name="Slide Number Placeholder 3">
             <a:extLst>
               <a:ext uri="{FF2B5EF4-FFF2-40B4-BE49-F238E27FC236}">
-                <a16:creationId xmlns:a16="http://schemas.microsoft.com/office/drawing/2014/main" id="{85921F72-AA63-D94C-83A7-B6192A8C1282}"/>
+                <a16:creationId xmlns:a16="http://schemas.microsoft.com/office/drawing/2014/main" xmlns="" id="{85921F72-AA63-D94C-83A7-B6192A8C1282}"/>
               </a:ext>
             </a:extLst>
           </p:cNvPr>
@@ -2147,7 +2148,7 @@
           <a:p>
             <a:fld id="{27776172-C73E-4E46-890D-D4E8EEFE01EB}" type="slidenum">
               <a:rPr lang="de-DE" smtClean="0"/>
-              <a:t>‹#›</a:t>
+              <a:t>‹Nr.›</a:t>
             </a:fld>
             <a:endParaRPr lang="de-DE"/>
           </a:p>
@@ -2188,7 +2189,7 @@
           <p:cNvPr id="2" name="Title 1">
             <a:extLst>
               <a:ext uri="{FF2B5EF4-FFF2-40B4-BE49-F238E27FC236}">
-                <a16:creationId xmlns:a16="http://schemas.microsoft.com/office/drawing/2014/main" id="{41DBC4F3-6998-A94B-9C92-218DE8EEB57A}"/>
+                <a16:creationId xmlns:a16="http://schemas.microsoft.com/office/drawing/2014/main" xmlns="" id="{41DBC4F3-6998-A94B-9C92-218DE8EEB57A}"/>
               </a:ext>
             </a:extLst>
           </p:cNvPr>
@@ -2226,7 +2227,7 @@
           <p:cNvPr id="3" name="Content Placeholder 2">
             <a:extLst>
               <a:ext uri="{FF2B5EF4-FFF2-40B4-BE49-F238E27FC236}">
-                <a16:creationId xmlns:a16="http://schemas.microsoft.com/office/drawing/2014/main" id="{CCC655D7-A371-E346-97F3-CBA5EF451BAD}"/>
+                <a16:creationId xmlns:a16="http://schemas.microsoft.com/office/drawing/2014/main" xmlns="" id="{CCC655D7-A371-E346-97F3-CBA5EF451BAD}"/>
               </a:ext>
             </a:extLst>
           </p:cNvPr>
@@ -2317,7 +2318,7 @@
           <p:cNvPr id="4" name="Text Placeholder 3">
             <a:extLst>
               <a:ext uri="{FF2B5EF4-FFF2-40B4-BE49-F238E27FC236}">
-                <a16:creationId xmlns:a16="http://schemas.microsoft.com/office/drawing/2014/main" id="{5D2D50C8-4776-924E-A59E-D9490CA72870}"/>
+                <a16:creationId xmlns:a16="http://schemas.microsoft.com/office/drawing/2014/main" xmlns="" id="{5D2D50C8-4776-924E-A59E-D9490CA72870}"/>
               </a:ext>
             </a:extLst>
           </p:cNvPr>
@@ -2388,7 +2389,7 @@
           <p:cNvPr id="5" name="Date Placeholder 4">
             <a:extLst>
               <a:ext uri="{FF2B5EF4-FFF2-40B4-BE49-F238E27FC236}">
-                <a16:creationId xmlns:a16="http://schemas.microsoft.com/office/drawing/2014/main" id="{B725A9FF-57A4-3340-BF8F-9818AEE4EE0A}"/>
+                <a16:creationId xmlns:a16="http://schemas.microsoft.com/office/drawing/2014/main" xmlns="" id="{B725A9FF-57A4-3340-BF8F-9818AEE4EE0A}"/>
               </a:ext>
             </a:extLst>
           </p:cNvPr>
@@ -2406,7 +2407,7 @@
           <a:p>
             <a:fld id="{4AAF318C-B15B-B14A-B88E-D91B1F600C11}" type="datetimeFigureOut">
               <a:rPr lang="de-DE" smtClean="0"/>
-              <a:t>09.01.19</a:t>
+              <a:t>12.01.19</a:t>
             </a:fld>
             <a:endParaRPr lang="de-DE"/>
           </a:p>
@@ -2417,7 +2418,7 @@
           <p:cNvPr id="6" name="Footer Placeholder 5">
             <a:extLst>
               <a:ext uri="{FF2B5EF4-FFF2-40B4-BE49-F238E27FC236}">
-                <a16:creationId xmlns:a16="http://schemas.microsoft.com/office/drawing/2014/main" id="{509D6E6D-F0FB-2C47-889B-7314E3DA280A}"/>
+                <a16:creationId xmlns:a16="http://schemas.microsoft.com/office/drawing/2014/main" xmlns="" id="{509D6E6D-F0FB-2C47-889B-7314E3DA280A}"/>
               </a:ext>
             </a:extLst>
           </p:cNvPr>
@@ -2442,7 +2443,7 @@
           <p:cNvPr id="7" name="Slide Number Placeholder 6">
             <a:extLst>
               <a:ext uri="{FF2B5EF4-FFF2-40B4-BE49-F238E27FC236}">
-                <a16:creationId xmlns:a16="http://schemas.microsoft.com/office/drawing/2014/main" id="{1B72F683-05D0-5F47-9FF2-1845621D218B}"/>
+                <a16:creationId xmlns:a16="http://schemas.microsoft.com/office/drawing/2014/main" xmlns="" id="{1B72F683-05D0-5F47-9FF2-1845621D218B}"/>
               </a:ext>
             </a:extLst>
           </p:cNvPr>
@@ -2460,7 +2461,7 @@
           <a:p>
             <a:fld id="{27776172-C73E-4E46-890D-D4E8EEFE01EB}" type="slidenum">
               <a:rPr lang="de-DE" smtClean="0"/>
-              <a:t>‹#›</a:t>
+              <a:t>‹Nr.›</a:t>
             </a:fld>
             <a:endParaRPr lang="de-DE"/>
           </a:p>
@@ -2501,7 +2502,7 @@
           <p:cNvPr id="2" name="Title 1">
             <a:extLst>
               <a:ext uri="{FF2B5EF4-FFF2-40B4-BE49-F238E27FC236}">
-                <a16:creationId xmlns:a16="http://schemas.microsoft.com/office/drawing/2014/main" id="{F84E31C5-03C0-2240-945A-A78BE0163434}"/>
+                <a16:creationId xmlns:a16="http://schemas.microsoft.com/office/drawing/2014/main" xmlns="" id="{F84E31C5-03C0-2240-945A-A78BE0163434}"/>
               </a:ext>
             </a:extLst>
           </p:cNvPr>
@@ -2539,7 +2540,7 @@
           <p:cNvPr id="3" name="Picture Placeholder 2">
             <a:extLst>
               <a:ext uri="{FF2B5EF4-FFF2-40B4-BE49-F238E27FC236}">
-                <a16:creationId xmlns:a16="http://schemas.microsoft.com/office/drawing/2014/main" id="{6E723FC6-10F0-6243-8B74-0CC07D8D5187}"/>
+                <a16:creationId xmlns:a16="http://schemas.microsoft.com/office/drawing/2014/main" xmlns="" id="{6E723FC6-10F0-6243-8B74-0CC07D8D5187}"/>
               </a:ext>
             </a:extLst>
           </p:cNvPr>
@@ -2606,7 +2607,7 @@
           <p:cNvPr id="4" name="Text Placeholder 3">
             <a:extLst>
               <a:ext uri="{FF2B5EF4-FFF2-40B4-BE49-F238E27FC236}">
-                <a16:creationId xmlns:a16="http://schemas.microsoft.com/office/drawing/2014/main" id="{403E1A69-A7F7-FC4C-8FFA-A834CA20812E}"/>
+                <a16:creationId xmlns:a16="http://schemas.microsoft.com/office/drawing/2014/main" xmlns="" id="{403E1A69-A7F7-FC4C-8FFA-A834CA20812E}"/>
               </a:ext>
             </a:extLst>
           </p:cNvPr>
@@ -2677,7 +2678,7 @@
           <p:cNvPr id="5" name="Date Placeholder 4">
             <a:extLst>
               <a:ext uri="{FF2B5EF4-FFF2-40B4-BE49-F238E27FC236}">
-                <a16:creationId xmlns:a16="http://schemas.microsoft.com/office/drawing/2014/main" id="{2B6162C7-F490-8644-9A7C-4032C68F4663}"/>
+                <a16:creationId xmlns:a16="http://schemas.microsoft.com/office/drawing/2014/main" xmlns="" id="{2B6162C7-F490-8644-9A7C-4032C68F4663}"/>
               </a:ext>
             </a:extLst>
           </p:cNvPr>
@@ -2695,7 +2696,7 @@
           <a:p>
             <a:fld id="{4AAF318C-B15B-B14A-B88E-D91B1F600C11}" type="datetimeFigureOut">
               <a:rPr lang="de-DE" smtClean="0"/>
-              <a:t>09.01.19</a:t>
+              <a:t>12.01.19</a:t>
             </a:fld>
             <a:endParaRPr lang="de-DE"/>
           </a:p>
@@ -2706,7 +2707,7 @@
           <p:cNvPr id="6" name="Footer Placeholder 5">
             <a:extLst>
               <a:ext uri="{FF2B5EF4-FFF2-40B4-BE49-F238E27FC236}">
-                <a16:creationId xmlns:a16="http://schemas.microsoft.com/office/drawing/2014/main" id="{0C7E709D-8184-6D44-A6FE-40525CD66D90}"/>
+                <a16:creationId xmlns:a16="http://schemas.microsoft.com/office/drawing/2014/main" xmlns="" id="{0C7E709D-8184-6D44-A6FE-40525CD66D90}"/>
               </a:ext>
             </a:extLst>
           </p:cNvPr>
@@ -2731,7 +2732,7 @@
           <p:cNvPr id="7" name="Slide Number Placeholder 6">
             <a:extLst>
               <a:ext uri="{FF2B5EF4-FFF2-40B4-BE49-F238E27FC236}">
-                <a16:creationId xmlns:a16="http://schemas.microsoft.com/office/drawing/2014/main" id="{E9583619-C7B7-F34F-BDB4-88C321407442}"/>
+                <a16:creationId xmlns:a16="http://schemas.microsoft.com/office/drawing/2014/main" xmlns="" id="{E9583619-C7B7-F34F-BDB4-88C321407442}"/>
               </a:ext>
             </a:extLst>
           </p:cNvPr>
@@ -2749,7 +2750,7 @@
           <a:p>
             <a:fld id="{27776172-C73E-4E46-890D-D4E8EEFE01EB}" type="slidenum">
               <a:rPr lang="de-DE" smtClean="0"/>
-              <a:t>‹#›</a:t>
+              <a:t>‹Nr.›</a:t>
             </a:fld>
             <a:endParaRPr lang="de-DE"/>
           </a:p>
@@ -2795,7 +2796,7 @@
           <p:cNvPr id="2" name="Title Placeholder 1">
             <a:extLst>
               <a:ext uri="{FF2B5EF4-FFF2-40B4-BE49-F238E27FC236}">
-                <a16:creationId xmlns:a16="http://schemas.microsoft.com/office/drawing/2014/main" id="{026433B1-A9A4-6542-B875-83F87D9EA388}"/>
+                <a16:creationId xmlns:a16="http://schemas.microsoft.com/office/drawing/2014/main" xmlns="" id="{026433B1-A9A4-6542-B875-83F87D9EA388}"/>
               </a:ext>
             </a:extLst>
           </p:cNvPr>
@@ -2834,7 +2835,7 @@
           <p:cNvPr id="3" name="Text Placeholder 2">
             <a:extLst>
               <a:ext uri="{FF2B5EF4-FFF2-40B4-BE49-F238E27FC236}">
-                <a16:creationId xmlns:a16="http://schemas.microsoft.com/office/drawing/2014/main" id="{C37FB5F1-7C7B-3C47-AFEC-3A4EAE15A524}"/>
+                <a16:creationId xmlns:a16="http://schemas.microsoft.com/office/drawing/2014/main" xmlns="" id="{C37FB5F1-7C7B-3C47-AFEC-3A4EAE15A524}"/>
               </a:ext>
             </a:extLst>
           </p:cNvPr>
@@ -2902,7 +2903,7 @@
           <p:cNvPr id="4" name="Date Placeholder 3">
             <a:extLst>
               <a:ext uri="{FF2B5EF4-FFF2-40B4-BE49-F238E27FC236}">
-                <a16:creationId xmlns:a16="http://schemas.microsoft.com/office/drawing/2014/main" id="{C9075B1B-FFE5-F04C-BA41-DD39C6852BF0}"/>
+                <a16:creationId xmlns:a16="http://schemas.microsoft.com/office/drawing/2014/main" xmlns="" id="{C9075B1B-FFE5-F04C-BA41-DD39C6852BF0}"/>
               </a:ext>
             </a:extLst>
           </p:cNvPr>
@@ -2938,7 +2939,7 @@
           <a:p>
             <a:fld id="{4AAF318C-B15B-B14A-B88E-D91B1F600C11}" type="datetimeFigureOut">
               <a:rPr lang="de-DE" smtClean="0"/>
-              <a:t>09.01.19</a:t>
+              <a:t>12.01.19</a:t>
             </a:fld>
             <a:endParaRPr lang="de-DE"/>
           </a:p>
@@ -2949,7 +2950,7 @@
           <p:cNvPr id="5" name="Footer Placeholder 4">
             <a:extLst>
               <a:ext uri="{FF2B5EF4-FFF2-40B4-BE49-F238E27FC236}">
-                <a16:creationId xmlns:a16="http://schemas.microsoft.com/office/drawing/2014/main" id="{1190F857-4792-534C-BE26-C1A95E8923E1}"/>
+                <a16:creationId xmlns:a16="http://schemas.microsoft.com/office/drawing/2014/main" xmlns="" id="{1190F857-4792-534C-BE26-C1A95E8923E1}"/>
               </a:ext>
             </a:extLst>
           </p:cNvPr>
@@ -2992,7 +2993,7 @@
           <p:cNvPr id="6" name="Slide Number Placeholder 5">
             <a:extLst>
               <a:ext uri="{FF2B5EF4-FFF2-40B4-BE49-F238E27FC236}">
-                <a16:creationId xmlns:a16="http://schemas.microsoft.com/office/drawing/2014/main" id="{9F974907-328B-C34B-B11A-40EDBFE2CEA3}"/>
+                <a16:creationId xmlns:a16="http://schemas.microsoft.com/office/drawing/2014/main" xmlns="" id="{9F974907-328B-C34B-B11A-40EDBFE2CEA3}"/>
               </a:ext>
             </a:extLst>
           </p:cNvPr>
@@ -3028,7 +3029,7 @@
           <a:p>
             <a:fld id="{27776172-C73E-4E46-890D-D4E8EEFE01EB}" type="slidenum">
               <a:rPr lang="de-DE" smtClean="0"/>
-              <a:t>‹#›</a:t>
+              <a:t>‹Nr.›</a:t>
             </a:fld>
             <a:endParaRPr lang="de-DE"/>
           </a:p>
@@ -3360,7 +3361,7 @@
           <p:cNvPr id="2" name="Title 1">
             <a:extLst>
               <a:ext uri="{FF2B5EF4-FFF2-40B4-BE49-F238E27FC236}">
-                <a16:creationId xmlns:a16="http://schemas.microsoft.com/office/drawing/2014/main" id="{23BD91A2-4FC8-DD48-8CB1-7D060CBEB531}"/>
+                <a16:creationId xmlns:a16="http://schemas.microsoft.com/office/drawing/2014/main" xmlns="" id="{23BD91A2-4FC8-DD48-8CB1-7D060CBEB531}"/>
               </a:ext>
             </a:extLst>
           </p:cNvPr>
@@ -3390,7 +3391,7 @@
           <p:cNvPr id="3" name="Subtitle 2">
             <a:extLst>
               <a:ext uri="{FF2B5EF4-FFF2-40B4-BE49-F238E27FC236}">
-                <a16:creationId xmlns:a16="http://schemas.microsoft.com/office/drawing/2014/main" id="{C4FFD547-39F9-274E-8825-0537D8110BD5}"/>
+                <a16:creationId xmlns:a16="http://schemas.microsoft.com/office/drawing/2014/main" xmlns="" id="{C4FFD547-39F9-274E-8825-0537D8110BD5}"/>
               </a:ext>
             </a:extLst>
           </p:cNvPr>
@@ -3414,6 +3415,541 @@
     <p:extLst>
       <p:ext uri="{BB962C8B-B14F-4D97-AF65-F5344CB8AC3E}">
         <p14:creationId xmlns:p14="http://schemas.microsoft.com/office/powerpoint/2010/main" val="1351002131"/>
+      </p:ext>
+    </p:extLst>
+  </p:cSld>
+  <p:clrMapOvr>
+    <a:masterClrMapping/>
+  </p:clrMapOvr>
+</p:sld>
+</file>
+
+<file path=ppt/slides/slide10.xml><?xml version="1.0" encoding="utf-8"?>
+<p:sld xmlns:a="http://schemas.openxmlformats.org/drawingml/2006/main" xmlns:r="http://schemas.openxmlformats.org/officeDocument/2006/relationships" xmlns:p="http://schemas.openxmlformats.org/presentationml/2006/main">
+  <p:cSld>
+    <p:spTree>
+      <p:nvGrpSpPr>
+        <p:cNvPr id="1" name=""/>
+        <p:cNvGrpSpPr/>
+        <p:nvPr/>
+      </p:nvGrpSpPr>
+      <p:grpSpPr>
+        <a:xfrm>
+          <a:off x="0" y="0"/>
+          <a:ext cx="0" cy="0"/>
+          <a:chOff x="0" y="0"/>
+          <a:chExt cx="0" cy="0"/>
+        </a:xfrm>
+      </p:grpSpPr>
+      <p:sp>
+        <p:nvSpPr>
+          <p:cNvPr id="2" name="Titel 1"/>
+          <p:cNvSpPr>
+            <a:spLocks noGrp="1"/>
+          </p:cNvSpPr>
+          <p:nvPr>
+            <p:ph type="title"/>
+          </p:nvPr>
+        </p:nvSpPr>
+        <p:spPr/>
+        <p:txBody>
+          <a:bodyPr>
+            <a:normAutofit/>
+          </a:bodyPr>
+          <a:lstStyle/>
+          <a:p>
+            <a:r>
+              <a:rPr lang="de-DE" dirty="0"/>
+              <a:t>Ermitteln Sie die Ordnung und den </a:t>
+            </a:r>
+            <a:r>
+              <a:rPr lang="de-DE" dirty="0" err="1"/>
+              <a:t>Kofaktor</a:t>
+            </a:r>
+            <a:r>
+              <a:rPr lang="de-DE" dirty="0"/>
+              <a:t> des Punktes P aus b). </a:t>
+            </a:r>
+            <a:endParaRPr lang="de-DE" dirty="0"/>
+          </a:p>
+        </p:txBody>
+      </p:sp>
+      <p:sp>
+        <p:nvSpPr>
+          <p:cNvPr id="3" name="Inhaltsplatzhalter 2"/>
+          <p:cNvSpPr>
+            <a:spLocks noGrp="1"/>
+          </p:cNvSpPr>
+          <p:nvPr>
+            <p:ph idx="1"/>
+          </p:nvPr>
+        </p:nvSpPr>
+        <p:spPr/>
+        <p:txBody>
+          <a:bodyPr>
+            <a:normAutofit fontScale="92500" lnSpcReduction="10000"/>
+          </a:bodyPr>
+          <a:lstStyle/>
+          <a:p>
+            <a:pPr marL="0" indent="0">
+              <a:buNone/>
+            </a:pPr>
+            <a:r>
+              <a:rPr lang="de-DE" dirty="0" err="1">
+                <a:solidFill>
+                  <a:srgbClr val="CC7832"/>
+                </a:solidFill>
+              </a:rPr>
+              <a:t>public</a:t>
+            </a:r>
+            <a:r>
+              <a:rPr lang="de-DE" dirty="0">
+                <a:solidFill>
+                  <a:srgbClr val="CC7832"/>
+                </a:solidFill>
+              </a:rPr>
+              <a:t> </a:t>
+            </a:r>
+            <a:r>
+              <a:rPr lang="de-DE" dirty="0" err="1"/>
+              <a:t>BigInteger</a:t>
+            </a:r>
+            <a:r>
+              <a:rPr lang="de-DE" dirty="0"/>
+              <a:t> </a:t>
+            </a:r>
+            <a:r>
+              <a:rPr lang="de-DE" dirty="0" err="1">
+                <a:solidFill>
+                  <a:srgbClr val="FFC66D"/>
+                </a:solidFill>
+              </a:rPr>
+              <a:t>getOrder</a:t>
+            </a:r>
+            <a:r>
+              <a:rPr lang="de-DE" dirty="0"/>
+              <a:t>() {</a:t>
+            </a:r>
+            <a:br>
+              <a:rPr lang="de-DE" dirty="0"/>
+            </a:br>
+            <a:r>
+              <a:rPr lang="de-DE" dirty="0"/>
+              <a:t>    </a:t>
+            </a:r>
+            <a:r>
+              <a:rPr lang="de-DE" dirty="0" err="1"/>
+              <a:t>EllipticCurveGroupElement</a:t>
+            </a:r>
+            <a:r>
+              <a:rPr lang="de-DE" dirty="0"/>
+              <a:t> </a:t>
+            </a:r>
+            <a:r>
+              <a:rPr lang="de-DE" dirty="0" err="1"/>
+              <a:t>element</a:t>
+            </a:r>
+            <a:r>
+              <a:rPr lang="de-DE" dirty="0"/>
+              <a:t> = </a:t>
+            </a:r>
+            <a:r>
+              <a:rPr lang="de-DE" dirty="0" err="1">
+                <a:solidFill>
+                  <a:srgbClr val="CC7832"/>
+                </a:solidFill>
+              </a:rPr>
+              <a:t>this</a:t>
+            </a:r>
+            <a:r>
+              <a:rPr lang="de-DE" dirty="0">
+                <a:solidFill>
+                  <a:srgbClr val="CC7832"/>
+                </a:solidFill>
+              </a:rPr>
+              <a:t>;</a:t>
+            </a:r>
+            <a:br>
+              <a:rPr lang="de-DE" dirty="0">
+                <a:solidFill>
+                  <a:srgbClr val="CC7832"/>
+                </a:solidFill>
+              </a:rPr>
+            </a:br>
+            <a:r>
+              <a:rPr lang="de-DE" dirty="0">
+                <a:solidFill>
+                  <a:srgbClr val="CC7832"/>
+                </a:solidFill>
+              </a:rPr>
+              <a:t>    </a:t>
+            </a:r>
+            <a:r>
+              <a:rPr lang="de-DE" dirty="0" err="1"/>
+              <a:t>BigInteger</a:t>
+            </a:r>
+            <a:r>
+              <a:rPr lang="de-DE" dirty="0"/>
+              <a:t> </a:t>
+            </a:r>
+            <a:r>
+              <a:rPr lang="de-DE" dirty="0" err="1"/>
+              <a:t>order</a:t>
+            </a:r>
+            <a:r>
+              <a:rPr lang="de-DE" dirty="0">
+                <a:solidFill>
+                  <a:srgbClr val="CC7832"/>
+                </a:solidFill>
+              </a:rPr>
+              <a:t>;</a:t>
+            </a:r>
+            <a:br>
+              <a:rPr lang="de-DE" dirty="0">
+                <a:solidFill>
+                  <a:srgbClr val="CC7832"/>
+                </a:solidFill>
+              </a:rPr>
+            </a:br>
+            <a:r>
+              <a:rPr lang="de-DE" dirty="0">
+                <a:solidFill>
+                  <a:srgbClr val="CC7832"/>
+                </a:solidFill>
+              </a:rPr>
+              <a:t>    </a:t>
+            </a:r>
+            <a:r>
+              <a:rPr lang="de-DE" dirty="0" err="1">
+                <a:solidFill>
+                  <a:srgbClr val="CC7832"/>
+                </a:solidFill>
+              </a:rPr>
+              <a:t>for</a:t>
+            </a:r>
+            <a:r>
+              <a:rPr lang="de-DE" dirty="0"/>
+              <a:t>(</a:t>
+            </a:r>
+            <a:r>
+              <a:rPr lang="de-DE" dirty="0" err="1"/>
+              <a:t>order</a:t>
+            </a:r>
+            <a:r>
+              <a:rPr lang="de-DE" dirty="0"/>
+              <a:t> = </a:t>
+            </a:r>
+            <a:r>
+              <a:rPr lang="de-DE" dirty="0" err="1"/>
+              <a:t>BigInteger.</a:t>
+            </a:r>
+            <a:r>
+              <a:rPr lang="de-DE" i="1" dirty="0" err="1">
+                <a:solidFill>
+                  <a:srgbClr val="9876AA"/>
+                </a:solidFill>
+              </a:rPr>
+              <a:t>ONE</a:t>
+            </a:r>
+            <a:r>
+              <a:rPr lang="de-DE" dirty="0">
+                <a:solidFill>
+                  <a:srgbClr val="CC7832"/>
+                </a:solidFill>
+              </a:rPr>
+              <a:t>; </a:t>
+            </a:r>
+            <a:r>
+              <a:rPr lang="de-DE" dirty="0" err="1"/>
+              <a:t>element</a:t>
+            </a:r>
+            <a:r>
+              <a:rPr lang="de-DE" dirty="0"/>
+              <a:t> != </a:t>
+            </a:r>
+            <a:r>
+              <a:rPr lang="de-DE" i="1" dirty="0">
+                <a:solidFill>
+                  <a:srgbClr val="9876AA"/>
+                </a:solidFill>
+              </a:rPr>
+              <a:t>NEUTRAL_ELEMENT</a:t>
+            </a:r>
+            <a:r>
+              <a:rPr lang="de-DE" dirty="0">
+                <a:solidFill>
+                  <a:srgbClr val="CC7832"/>
+                </a:solidFill>
+              </a:rPr>
+              <a:t>; </a:t>
+            </a:r>
+            <a:r>
+              <a:rPr lang="de-DE" dirty="0" err="1"/>
+              <a:t>order</a:t>
+            </a:r>
+            <a:r>
+              <a:rPr lang="de-DE" dirty="0"/>
+              <a:t> = </a:t>
+            </a:r>
+            <a:r>
+              <a:rPr lang="de-DE" dirty="0" err="1"/>
+              <a:t>order.add</a:t>
+            </a:r>
+            <a:r>
+              <a:rPr lang="de-DE" dirty="0"/>
+              <a:t>(</a:t>
+            </a:r>
+            <a:r>
+              <a:rPr lang="de-DE" dirty="0" err="1"/>
+              <a:t>BigInteger.</a:t>
+            </a:r>
+            <a:r>
+              <a:rPr lang="de-DE" i="1" dirty="0" err="1">
+                <a:solidFill>
+                  <a:srgbClr val="9876AA"/>
+                </a:solidFill>
+              </a:rPr>
+              <a:t>ONE</a:t>
+            </a:r>
+            <a:r>
+              <a:rPr lang="de-DE" dirty="0"/>
+              <a:t>)) {</a:t>
+            </a:r>
+            <a:br>
+              <a:rPr lang="de-DE" dirty="0"/>
+            </a:br>
+            <a:r>
+              <a:rPr lang="de-DE" dirty="0"/>
+              <a:t>        </a:t>
+            </a:r>
+            <a:r>
+              <a:rPr lang="de-DE" dirty="0" err="1"/>
+              <a:t>element</a:t>
+            </a:r>
+            <a:r>
+              <a:rPr lang="de-DE" dirty="0"/>
+              <a:t> = </a:t>
+            </a:r>
+            <a:r>
+              <a:rPr lang="de-DE" dirty="0" err="1"/>
+              <a:t>element.multiply</a:t>
+            </a:r>
+            <a:r>
+              <a:rPr lang="de-DE" dirty="0"/>
+              <a:t>(</a:t>
+            </a:r>
+            <a:r>
+              <a:rPr lang="de-DE" dirty="0" err="1">
+                <a:solidFill>
+                  <a:srgbClr val="CC7832"/>
+                </a:solidFill>
+              </a:rPr>
+              <a:t>this</a:t>
+            </a:r>
+            <a:r>
+              <a:rPr lang="de-DE" dirty="0"/>
+              <a:t>)</a:t>
+            </a:r>
+            <a:r>
+              <a:rPr lang="de-DE" dirty="0">
+                <a:solidFill>
+                  <a:srgbClr val="CC7832"/>
+                </a:solidFill>
+              </a:rPr>
+              <a:t>;</a:t>
+            </a:r>
+            <a:br>
+              <a:rPr lang="de-DE" dirty="0">
+                <a:solidFill>
+                  <a:srgbClr val="CC7832"/>
+                </a:solidFill>
+              </a:rPr>
+            </a:br>
+            <a:r>
+              <a:rPr lang="de-DE" dirty="0">
+                <a:solidFill>
+                  <a:srgbClr val="CC7832"/>
+                </a:solidFill>
+              </a:rPr>
+              <a:t>    </a:t>
+            </a:r>
+            <a:r>
+              <a:rPr lang="de-DE" dirty="0"/>
+              <a:t>}</a:t>
+            </a:r>
+            <a:br>
+              <a:rPr lang="de-DE" dirty="0"/>
+            </a:br>
+            <a:r>
+              <a:rPr lang="de-DE" dirty="0"/>
+              <a:t>    </a:t>
+            </a:r>
+            <a:r>
+              <a:rPr lang="de-DE" dirty="0" err="1">
+                <a:solidFill>
+                  <a:srgbClr val="CC7832"/>
+                </a:solidFill>
+              </a:rPr>
+              <a:t>return</a:t>
+            </a:r>
+            <a:r>
+              <a:rPr lang="de-DE" dirty="0">
+                <a:solidFill>
+                  <a:srgbClr val="CC7832"/>
+                </a:solidFill>
+              </a:rPr>
+              <a:t> </a:t>
+            </a:r>
+            <a:r>
+              <a:rPr lang="de-DE" dirty="0" err="1"/>
+              <a:t>order</a:t>
+            </a:r>
+            <a:r>
+              <a:rPr lang="de-DE" dirty="0">
+                <a:solidFill>
+                  <a:srgbClr val="CC7832"/>
+                </a:solidFill>
+              </a:rPr>
+              <a:t>;</a:t>
+            </a:r>
+            <a:br>
+              <a:rPr lang="de-DE" dirty="0">
+                <a:solidFill>
+                  <a:srgbClr val="CC7832"/>
+                </a:solidFill>
+              </a:rPr>
+            </a:br>
+            <a:r>
+              <a:rPr lang="de-DE" dirty="0"/>
+              <a:t>}</a:t>
+            </a:r>
+            <a:br>
+              <a:rPr lang="de-DE" dirty="0"/>
+            </a:br>
+            <a:r>
+              <a:rPr lang="de-DE" dirty="0"/>
+              <a:t/>
+            </a:r>
+            <a:br>
+              <a:rPr lang="de-DE" dirty="0"/>
+            </a:br>
+            <a:r>
+              <a:rPr lang="de-DE" dirty="0" err="1">
+                <a:solidFill>
+                  <a:srgbClr val="CC7832"/>
+                </a:solidFill>
+              </a:rPr>
+              <a:t>public</a:t>
+            </a:r>
+            <a:r>
+              <a:rPr lang="de-DE" dirty="0">
+                <a:solidFill>
+                  <a:srgbClr val="CC7832"/>
+                </a:solidFill>
+              </a:rPr>
+              <a:t> </a:t>
+            </a:r>
+            <a:r>
+              <a:rPr lang="de-DE" dirty="0" err="1"/>
+              <a:t>BigInteger</a:t>
+            </a:r>
+            <a:r>
+              <a:rPr lang="de-DE" dirty="0"/>
+              <a:t> </a:t>
+            </a:r>
+            <a:r>
+              <a:rPr lang="de-DE" dirty="0" err="1">
+                <a:solidFill>
+                  <a:srgbClr val="FFC66D"/>
+                </a:solidFill>
+              </a:rPr>
+              <a:t>getCofactor</a:t>
+            </a:r>
+            <a:r>
+              <a:rPr lang="de-DE" dirty="0"/>
+              <a:t>() {</a:t>
+            </a:r>
+            <a:br>
+              <a:rPr lang="de-DE" dirty="0"/>
+            </a:br>
+            <a:r>
+              <a:rPr lang="de-DE" dirty="0"/>
+              <a:t>    </a:t>
+            </a:r>
+            <a:r>
+              <a:rPr lang="de-DE" dirty="0" err="1">
+                <a:solidFill>
+                  <a:srgbClr val="CC7832"/>
+                </a:solidFill>
+              </a:rPr>
+              <a:t>return</a:t>
+            </a:r>
+            <a:r>
+              <a:rPr lang="de-DE" dirty="0">
+                <a:solidFill>
+                  <a:srgbClr val="CC7832"/>
+                </a:solidFill>
+              </a:rPr>
+              <a:t> </a:t>
+            </a:r>
+            <a:r>
+              <a:rPr lang="de-DE" dirty="0" err="1">
+                <a:solidFill>
+                  <a:srgbClr val="9876AA"/>
+                </a:solidFill>
+              </a:rPr>
+              <a:t>group</a:t>
+            </a:r>
+            <a:r>
+              <a:rPr lang="de-DE" dirty="0" err="1"/>
+              <a:t>.getK</a:t>
+            </a:r>
+            <a:r>
+              <a:rPr lang="de-DE" dirty="0"/>
+              <a:t>().</a:t>
+            </a:r>
+            <a:r>
+              <a:rPr lang="de-DE" dirty="0" err="1"/>
+              <a:t>divide</a:t>
+            </a:r>
+            <a:r>
+              <a:rPr lang="de-DE" dirty="0"/>
+              <a:t>(</a:t>
+            </a:r>
+            <a:r>
+              <a:rPr lang="de-DE" dirty="0" err="1"/>
+              <a:t>getOrder</a:t>
+            </a:r>
+            <a:r>
+              <a:rPr lang="de-DE" dirty="0"/>
+              <a:t>())</a:t>
+            </a:r>
+            <a:r>
+              <a:rPr lang="de-DE" dirty="0">
+                <a:solidFill>
+                  <a:srgbClr val="CC7832"/>
+                </a:solidFill>
+              </a:rPr>
+              <a:t>;</a:t>
+            </a:r>
+            <a:br>
+              <a:rPr lang="de-DE" dirty="0">
+                <a:solidFill>
+                  <a:srgbClr val="CC7832"/>
+                </a:solidFill>
+              </a:rPr>
+            </a:br>
+            <a:r>
+              <a:rPr lang="de-DE" dirty="0"/>
+              <a:t>}</a:t>
+            </a:r>
+          </a:p>
+        </p:txBody>
+      </p:sp>
+    </p:spTree>
+    <p:extLst>
+      <p:ext uri="{BB962C8B-B14F-4D97-AF65-F5344CB8AC3E}">
+        <p14:creationId xmlns:p14="http://schemas.microsoft.com/office/powerpoint/2010/main" val="1115615244"/>
       </p:ext>
     </p:extLst>
   </p:cSld>
@@ -3445,7 +3981,7 @@
           <p:cNvPr id="2" name="Title 1">
             <a:extLst>
               <a:ext uri="{FF2B5EF4-FFF2-40B4-BE49-F238E27FC236}">
-                <a16:creationId xmlns:a16="http://schemas.microsoft.com/office/drawing/2014/main" id="{82AA0996-CDD4-F847-AD4A-461633A429C6}"/>
+                <a16:creationId xmlns:a16="http://schemas.microsoft.com/office/drawing/2014/main" xmlns="" id="{82AA0996-CDD4-F847-AD4A-461633A429C6}"/>
               </a:ext>
             </a:extLst>
           </p:cNvPr>
@@ -3475,7 +4011,7 @@
           <p:cNvPr id="7" name="Content Placeholder 6">
             <a:extLst>
               <a:ext uri="{FF2B5EF4-FFF2-40B4-BE49-F238E27FC236}">
-                <a16:creationId xmlns:a16="http://schemas.microsoft.com/office/drawing/2014/main" id="{8FBEFFB6-AC32-404A-ABF0-4D284D6A81C2}"/>
+                <a16:creationId xmlns:a16="http://schemas.microsoft.com/office/drawing/2014/main" xmlns="" id="{8FBEFFB6-AC32-404A-ABF0-4D284D6A81C2}"/>
               </a:ext>
             </a:extLst>
           </p:cNvPr>
@@ -3871,6 +4407,14 @@
                 </a:solidFill>
               </a:rPr>
             </a:br>
+            <a:r>
+              <a:rPr lang="de-DE" dirty="0">
+                <a:solidFill>
+                  <a:srgbClr val="CC7832"/>
+                </a:solidFill>
+              </a:rPr>
+              <a:t/>
+            </a:r>
             <a:br>
               <a:rPr lang="de-DE" dirty="0">
                 <a:solidFill>
@@ -3916,6 +4460,10 @@
             <a:br>
               <a:rPr lang="de-DE" dirty="0"/>
             </a:br>
+            <a:r>
+              <a:rPr lang="de-DE" dirty="0"/>
+              <a:t/>
+            </a:r>
             <a:br>
               <a:rPr lang="de-DE" dirty="0"/>
             </a:br>
@@ -4087,7 +4635,7 @@
           <p:cNvPr id="2" name="Title 1">
             <a:extLst>
               <a:ext uri="{FF2B5EF4-FFF2-40B4-BE49-F238E27FC236}">
-                <a16:creationId xmlns:a16="http://schemas.microsoft.com/office/drawing/2014/main" id="{003EB5B5-E3B6-2D4B-830F-75EC0273E95D}"/>
+                <a16:creationId xmlns:a16="http://schemas.microsoft.com/office/drawing/2014/main" xmlns="" id="{003EB5B5-E3B6-2D4B-830F-75EC0273E95D}"/>
               </a:ext>
             </a:extLst>
           </p:cNvPr>
@@ -4115,7 +4663,7 @@
           <p:cNvPr id="3" name="Content Placeholder 2">
             <a:extLst>
               <a:ext uri="{FF2B5EF4-FFF2-40B4-BE49-F238E27FC236}">
-                <a16:creationId xmlns:a16="http://schemas.microsoft.com/office/drawing/2014/main" id="{A32463AB-1527-1946-8709-B6D720EDBBD8}"/>
+                <a16:creationId xmlns:a16="http://schemas.microsoft.com/office/drawing/2014/main" xmlns="" id="{A32463AB-1527-1946-8709-B6D720EDBBD8}"/>
               </a:ext>
             </a:extLst>
           </p:cNvPr>
@@ -4242,7 +4790,7 @@
           <p:cNvPr id="2" name="Title 1">
             <a:extLst>
               <a:ext uri="{FF2B5EF4-FFF2-40B4-BE49-F238E27FC236}">
-                <a16:creationId xmlns:a16="http://schemas.microsoft.com/office/drawing/2014/main" id="{95135325-5FA6-A84C-91F1-F788EACF8C60}"/>
+                <a16:creationId xmlns:a16="http://schemas.microsoft.com/office/drawing/2014/main" xmlns="" id="{95135325-5FA6-A84C-91F1-F788EACF8C60}"/>
               </a:ext>
             </a:extLst>
           </p:cNvPr>
@@ -4312,7 +4860,7 @@
           <p:cNvPr id="3" name="Content Placeholder 2">
             <a:extLst>
               <a:ext uri="{FF2B5EF4-FFF2-40B4-BE49-F238E27FC236}">
-                <a16:creationId xmlns:a16="http://schemas.microsoft.com/office/drawing/2014/main" id="{78593AC8-A754-9944-BC73-B95172F1E028}"/>
+                <a16:creationId xmlns:a16="http://schemas.microsoft.com/office/drawing/2014/main" xmlns="" id="{78593AC8-A754-9944-BC73-B95172F1E028}"/>
               </a:ext>
             </a:extLst>
           </p:cNvPr>
@@ -4436,6 +4984,14 @@
               </a:rPr>
               <a:t>modulus</a:t>
             </a:r>
+            <a:r>
+              <a:rPr lang="de-DE" i="1" dirty="0">
+                <a:solidFill>
+                  <a:srgbClr val="629755"/>
+                </a:solidFill>
+              </a:rPr>
+              <a:t/>
+            </a:r>
             <a:br>
               <a:rPr lang="de-DE" i="1" dirty="0">
                 <a:solidFill>
@@ -4584,6 +5140,14 @@
                 </a:solidFill>
               </a:rPr>
             </a:br>
+            <a:r>
+              <a:rPr lang="de-DE" dirty="0">
+                <a:solidFill>
+                  <a:srgbClr val="CC7832"/>
+                </a:solidFill>
+              </a:rPr>
+              <a:t/>
+            </a:r>
             <a:br>
               <a:rPr lang="de-DE" dirty="0">
                 <a:solidFill>
@@ -4708,6 +5272,14 @@
                 </a:solidFill>
               </a:rPr>
             </a:br>
+            <a:r>
+              <a:rPr lang="de-DE" dirty="0">
+                <a:solidFill>
+                  <a:srgbClr val="CC7832"/>
+                </a:solidFill>
+              </a:rPr>
+              <a:t/>
+            </a:r>
             <a:br>
               <a:rPr lang="de-DE" dirty="0">
                 <a:solidFill>
@@ -4812,7 +5384,7 @@
           <p:cNvPr id="2" name="Title 1">
             <a:extLst>
               <a:ext uri="{FF2B5EF4-FFF2-40B4-BE49-F238E27FC236}">
-                <a16:creationId xmlns:a16="http://schemas.microsoft.com/office/drawing/2014/main" id="{165896E6-0471-B742-83B0-938DC7ACED6E}"/>
+                <a16:creationId xmlns:a16="http://schemas.microsoft.com/office/drawing/2014/main" xmlns="" id="{165896E6-0471-B742-83B0-938DC7ACED6E}"/>
               </a:ext>
             </a:extLst>
           </p:cNvPr>
@@ -4840,7 +5412,7 @@
           <p:cNvPr id="3" name="Content Placeholder 2">
             <a:extLst>
               <a:ext uri="{FF2B5EF4-FFF2-40B4-BE49-F238E27FC236}">
-                <a16:creationId xmlns:a16="http://schemas.microsoft.com/office/drawing/2014/main" id="{3899AB8E-EFA7-944A-AE6F-064589D05CC6}"/>
+                <a16:creationId xmlns:a16="http://schemas.microsoft.com/office/drawing/2014/main" xmlns="" id="{3899AB8E-EFA7-944A-AE6F-064589D05CC6}"/>
               </a:ext>
             </a:extLst>
           </p:cNvPr>
@@ -5314,7 +5886,7 @@
           <p:cNvPr id="2" name="Title 1">
             <a:extLst>
               <a:ext uri="{FF2B5EF4-FFF2-40B4-BE49-F238E27FC236}">
-                <a16:creationId xmlns:a16="http://schemas.microsoft.com/office/drawing/2014/main" id="{165896E6-0471-B742-83B0-938DC7ACED6E}"/>
+                <a16:creationId xmlns:a16="http://schemas.microsoft.com/office/drawing/2014/main" xmlns="" id="{165896E6-0471-B742-83B0-938DC7ACED6E}"/>
               </a:ext>
             </a:extLst>
           </p:cNvPr>
@@ -5342,7 +5914,7 @@
           <p:cNvPr id="3" name="Content Placeholder 2">
             <a:extLst>
               <a:ext uri="{FF2B5EF4-FFF2-40B4-BE49-F238E27FC236}">
-                <a16:creationId xmlns:a16="http://schemas.microsoft.com/office/drawing/2014/main" id="{3899AB8E-EFA7-944A-AE6F-064589D05CC6}"/>
+                <a16:creationId xmlns:a16="http://schemas.microsoft.com/office/drawing/2014/main" xmlns="" id="{3899AB8E-EFA7-944A-AE6F-064589D05CC6}"/>
               </a:ext>
             </a:extLst>
           </p:cNvPr>
@@ -5404,12 +5976,35 @@
               <a:t>(</a:t>
             </a:r>
             <a:r>
+              <a:rPr lang="de-DE" dirty="0">
+                <a:solidFill>
+                  <a:srgbClr val="CC7832"/>
+                </a:solidFill>
+              </a:rPr>
+              <a:t>final </a:t>
+            </a:r>
+            <a:r>
+              <a:rPr lang="de-DE" dirty="0" err="1"/>
+              <a:t>ZModZPStarElement</a:t>
+            </a:r>
+            <a:r>
+              <a:rPr lang="de-DE" dirty="0"/>
+              <a:t> x) {</a:t>
+            </a:r>
+            <a:br>
+              <a:rPr lang="de-DE" dirty="0"/>
+            </a:br>
+            <a:r>
+              <a:rPr lang="de-DE" dirty="0"/>
+              <a:t>    </a:t>
+            </a:r>
+            <a:r>
               <a:rPr lang="de-DE" dirty="0" err="1">
                 <a:solidFill>
                   <a:srgbClr val="CC7832"/>
                 </a:solidFill>
               </a:rPr>
-              <a:t>int</a:t>
+              <a:t>return</a:t>
             </a:r>
             <a:r>
               <a:rPr lang="de-DE" dirty="0">
@@ -5420,332 +6015,86 @@
               <a:t> </a:t>
             </a:r>
             <a:r>
-              <a:rPr lang="de-DE" dirty="0"/>
-              <a:t>x) {</a:t>
+              <a:rPr lang="de-DE" dirty="0" err="1"/>
+              <a:t>rightSideOfEccPointDefinition</a:t>
+            </a:r>
+            <a:r>
+              <a:rPr lang="de-DE" dirty="0"/>
+              <a:t>(x).</a:t>
+            </a:r>
+            <a:r>
+              <a:rPr lang="de-DE" dirty="0" err="1"/>
+              <a:t>root</a:t>
+            </a:r>
+            <a:r>
+              <a:rPr lang="de-DE" dirty="0"/>
+              <a:t>().</a:t>
+            </a:r>
+            <a:r>
+              <a:rPr lang="de-DE" dirty="0" err="1"/>
+              <a:t>map</a:t>
+            </a:r>
+            <a:r>
+              <a:rPr lang="de-DE" dirty="0"/>
+              <a:t>(</a:t>
+            </a:r>
+            <a:r>
+              <a:rPr lang="de-DE" dirty="0" err="1"/>
+              <a:t>y</a:t>
+            </a:r>
+            <a:r>
+              <a:rPr lang="de-DE" dirty="0"/>
+              <a:t> -&gt; </a:t>
+            </a:r>
+            <a:r>
+              <a:rPr lang="de-DE" dirty="0" err="1"/>
+              <a:t>getElement</a:t>
+            </a:r>
+            <a:r>
+              <a:rPr lang="de-DE" dirty="0"/>
+              <a:t>(</a:t>
+            </a:r>
+            <a:r>
+              <a:rPr lang="de-DE" dirty="0">
+                <a:solidFill>
+                  <a:srgbClr val="B389C5"/>
+                </a:solidFill>
+              </a:rPr>
+              <a:t>x</a:t>
+            </a:r>
+            <a:r>
+              <a:rPr lang="de-DE" dirty="0">
+                <a:solidFill>
+                  <a:srgbClr val="CC7832"/>
+                </a:solidFill>
+              </a:rPr>
+              <a:t>, </a:t>
+            </a:r>
+            <a:r>
+              <a:rPr lang="de-DE" dirty="0" err="1"/>
+              <a:t>y</a:t>
+            </a:r>
+            <a:r>
+              <a:rPr lang="de-DE" dirty="0"/>
+              <a:t>))</a:t>
+            </a:r>
+            <a:r>
+              <a:rPr lang="de-DE" dirty="0">
+                <a:solidFill>
+                  <a:srgbClr val="CC7832"/>
+                </a:solidFill>
+              </a:rPr>
+              <a:t>;</a:t>
             </a:r>
             <a:br>
-              <a:rPr lang="de-DE" dirty="0"/>
+              <a:rPr lang="de-DE" dirty="0">
+                <a:solidFill>
+                  <a:srgbClr val="CC7832"/>
+                </a:solidFill>
+              </a:rPr>
             </a:br>
             <a:r>
-              <a:rPr lang="de-DE" dirty="0"/>
-              <a:t>    </a:t>
-            </a:r>
-            <a:r>
-              <a:rPr lang="de-DE" dirty="0" err="1">
-                <a:solidFill>
-                  <a:srgbClr val="CC7832"/>
-                </a:solidFill>
-              </a:rPr>
-              <a:t>for</a:t>
-            </a:r>
-            <a:r>
-              <a:rPr lang="de-DE" dirty="0">
-                <a:solidFill>
-                  <a:srgbClr val="CC7832"/>
-                </a:solidFill>
-              </a:rPr>
-              <a:t> </a:t>
-            </a:r>
-            <a:r>
-              <a:rPr lang="de-DE" dirty="0"/>
-              <a:t>(</a:t>
-            </a:r>
-            <a:r>
-              <a:rPr lang="de-DE" dirty="0" err="1">
-                <a:solidFill>
-                  <a:srgbClr val="CC7832"/>
-                </a:solidFill>
-              </a:rPr>
-              <a:t>int</a:t>
-            </a:r>
-            <a:r>
-              <a:rPr lang="de-DE" dirty="0">
-                <a:solidFill>
-                  <a:srgbClr val="CC7832"/>
-                </a:solidFill>
-              </a:rPr>
-              <a:t> </a:t>
-            </a:r>
-            <a:r>
-              <a:rPr lang="de-DE" dirty="0" err="1"/>
-              <a:t>y</a:t>
-            </a:r>
-            <a:r>
-              <a:rPr lang="de-DE" dirty="0"/>
-              <a:t> = </a:t>
-            </a:r>
-            <a:r>
-              <a:rPr lang="de-DE" dirty="0">
-                <a:solidFill>
-                  <a:srgbClr val="6897BB"/>
-                </a:solidFill>
-              </a:rPr>
-              <a:t>0</a:t>
-            </a:r>
-            <a:r>
-              <a:rPr lang="de-DE" dirty="0">
-                <a:solidFill>
-                  <a:srgbClr val="CC7832"/>
-                </a:solidFill>
-              </a:rPr>
-              <a:t>; </a:t>
-            </a:r>
-            <a:r>
-              <a:rPr lang="de-DE" dirty="0" err="1"/>
-              <a:t>y</a:t>
-            </a:r>
-            <a:r>
-              <a:rPr lang="de-DE" dirty="0"/>
-              <a:t> &lt; </a:t>
-            </a:r>
-            <a:r>
-              <a:rPr lang="de-DE" dirty="0" err="1"/>
-              <a:t>getK</a:t>
-            </a:r>
-            <a:r>
-              <a:rPr lang="de-DE" dirty="0"/>
-              <a:t>().</a:t>
-            </a:r>
-            <a:r>
-              <a:rPr lang="de-DE" dirty="0" err="1"/>
-              <a:t>intValueExact</a:t>
-            </a:r>
-            <a:r>
-              <a:rPr lang="de-DE" dirty="0"/>
-              <a:t>() / </a:t>
-            </a:r>
-            <a:r>
-              <a:rPr lang="de-DE" dirty="0">
-                <a:solidFill>
-                  <a:srgbClr val="6897BB"/>
-                </a:solidFill>
-              </a:rPr>
-              <a:t>2 </a:t>
-            </a:r>
-            <a:r>
-              <a:rPr lang="de-DE" dirty="0"/>
-              <a:t>+ </a:t>
-            </a:r>
-            <a:r>
-              <a:rPr lang="de-DE" dirty="0">
-                <a:solidFill>
-                  <a:srgbClr val="6897BB"/>
-                </a:solidFill>
-              </a:rPr>
-              <a:t>1</a:t>
-            </a:r>
-            <a:r>
-              <a:rPr lang="de-DE" dirty="0">
-                <a:solidFill>
-                  <a:srgbClr val="CC7832"/>
-                </a:solidFill>
-              </a:rPr>
-              <a:t>; </a:t>
-            </a:r>
-            <a:r>
-              <a:rPr lang="de-DE" dirty="0" err="1"/>
-              <a:t>y</a:t>
-            </a:r>
-            <a:r>
-              <a:rPr lang="de-DE" dirty="0"/>
-              <a:t>++) {</a:t>
-            </a:r>
-            <a:br>
-              <a:rPr lang="de-DE" dirty="0"/>
-            </a:br>
-            <a:r>
-              <a:rPr lang="de-DE" dirty="0"/>
-              <a:t>        </a:t>
-            </a:r>
-            <a:r>
-              <a:rPr lang="de-DE" dirty="0" err="1">
-                <a:solidFill>
-                  <a:srgbClr val="CC7832"/>
-                </a:solidFill>
-              </a:rPr>
-              <a:t>if</a:t>
-            </a:r>
-            <a:r>
-              <a:rPr lang="de-DE" dirty="0">
-                <a:solidFill>
-                  <a:srgbClr val="CC7832"/>
-                </a:solidFill>
-              </a:rPr>
-              <a:t> </a:t>
-            </a:r>
-            <a:r>
-              <a:rPr lang="de-DE" dirty="0"/>
-              <a:t>(</a:t>
-            </a:r>
-            <a:r>
-              <a:rPr lang="de-DE" dirty="0" err="1"/>
-              <a:t>liesOnCurve</a:t>
-            </a:r>
-            <a:r>
-              <a:rPr lang="de-DE" dirty="0"/>
-              <a:t>(x</a:t>
-            </a:r>
-            <a:r>
-              <a:rPr lang="de-DE" dirty="0">
-                <a:solidFill>
-                  <a:srgbClr val="CC7832"/>
-                </a:solidFill>
-              </a:rPr>
-              <a:t>, </a:t>
-            </a:r>
-            <a:r>
-              <a:rPr lang="de-DE" dirty="0" err="1"/>
-              <a:t>y</a:t>
-            </a:r>
-            <a:r>
-              <a:rPr lang="de-DE" dirty="0"/>
-              <a:t>)) {</a:t>
-            </a:r>
-            <a:br>
-              <a:rPr lang="de-DE" dirty="0"/>
-            </a:br>
-            <a:r>
-              <a:rPr lang="de-DE" dirty="0"/>
-              <a:t>            </a:t>
-            </a:r>
-            <a:r>
-              <a:rPr lang="de-DE" dirty="0" err="1">
-                <a:solidFill>
-                  <a:srgbClr val="CC7832"/>
-                </a:solidFill>
-              </a:rPr>
-              <a:t>return</a:t>
-            </a:r>
-            <a:r>
-              <a:rPr lang="de-DE" dirty="0">
-                <a:solidFill>
-                  <a:srgbClr val="CC7832"/>
-                </a:solidFill>
-              </a:rPr>
-              <a:t> </a:t>
-            </a:r>
-            <a:r>
-              <a:rPr lang="de-DE" dirty="0" err="1"/>
-              <a:t>Optional.</a:t>
-            </a:r>
-            <a:r>
-              <a:rPr lang="de-DE" i="1" dirty="0" err="1"/>
-              <a:t>of</a:t>
-            </a:r>
-            <a:r>
-              <a:rPr lang="de-DE" dirty="0"/>
-              <a:t>(</a:t>
-            </a:r>
-            <a:r>
-              <a:rPr lang="de-DE" dirty="0" err="1"/>
-              <a:t>getElement</a:t>
-            </a:r>
-            <a:r>
-              <a:rPr lang="de-DE" dirty="0"/>
-              <a:t>(x</a:t>
-            </a:r>
-            <a:r>
-              <a:rPr lang="de-DE" dirty="0">
-                <a:solidFill>
-                  <a:srgbClr val="CC7832"/>
-                </a:solidFill>
-              </a:rPr>
-              <a:t>, </a:t>
-            </a:r>
-            <a:r>
-              <a:rPr lang="de-DE" dirty="0" err="1"/>
-              <a:t>y</a:t>
-            </a:r>
-            <a:r>
-              <a:rPr lang="de-DE" dirty="0"/>
-              <a:t>))</a:t>
-            </a:r>
-            <a:r>
-              <a:rPr lang="de-DE" dirty="0">
-                <a:solidFill>
-                  <a:srgbClr val="CC7832"/>
-                </a:solidFill>
-              </a:rPr>
-              <a:t>;</a:t>
-            </a:r>
-            <a:br>
-              <a:rPr lang="de-DE" dirty="0">
-                <a:solidFill>
-                  <a:srgbClr val="CC7832"/>
-                </a:solidFill>
-              </a:rPr>
-            </a:br>
-            <a:r>
-              <a:rPr lang="de-DE" dirty="0">
-                <a:solidFill>
-                  <a:srgbClr val="CC7832"/>
-                </a:solidFill>
-              </a:rPr>
-              <a:t>        </a:t>
-            </a:r>
-            <a:r>
-              <a:rPr lang="de-DE" dirty="0"/>
-              <a:t>}</a:t>
-            </a:r>
-            <a:br>
-              <a:rPr lang="de-DE" dirty="0"/>
-            </a:br>
-            <a:r>
-              <a:rPr lang="de-DE" dirty="0"/>
-              <a:t>    }</a:t>
-            </a:r>
-            <a:br>
-              <a:rPr lang="de-DE" dirty="0"/>
-            </a:br>
-            <a:r>
-              <a:rPr lang="de-DE" dirty="0"/>
-              <a:t>    </a:t>
-            </a:r>
-            <a:r>
-              <a:rPr lang="de-DE" dirty="0" err="1">
-                <a:solidFill>
-                  <a:srgbClr val="CC7832"/>
-                </a:solidFill>
-              </a:rPr>
-              <a:t>return</a:t>
-            </a:r>
-            <a:r>
-              <a:rPr lang="de-DE" dirty="0">
-                <a:solidFill>
-                  <a:srgbClr val="CC7832"/>
-                </a:solidFill>
-              </a:rPr>
-              <a:t> </a:t>
-            </a:r>
-            <a:r>
-              <a:rPr lang="de-DE" dirty="0" err="1"/>
-              <a:t>Optional.</a:t>
-            </a:r>
-            <a:r>
-              <a:rPr lang="de-DE" i="1" dirty="0" err="1"/>
-              <a:t>empty</a:t>
-            </a:r>
-            <a:r>
-              <a:rPr lang="de-DE" dirty="0"/>
-              <a:t>()</a:t>
-            </a:r>
-            <a:r>
-              <a:rPr lang="de-DE" dirty="0">
-                <a:solidFill>
-                  <a:srgbClr val="CC7832"/>
-                </a:solidFill>
-              </a:rPr>
-              <a:t>;</a:t>
-            </a:r>
-            <a:br>
-              <a:rPr lang="de-DE" dirty="0">
-                <a:solidFill>
-                  <a:srgbClr val="CC7832"/>
-                </a:solidFill>
-              </a:rPr>
-            </a:br>
-            <a:r>
-              <a:rPr lang="de-DE" dirty="0"/>
+              <a:rPr lang="de-DE" dirty="0" smtClean="0"/>
               <a:t>}</a:t>
             </a:r>
           </a:p>
@@ -5760,9 +6109,34 @@
               <a:buNone/>
             </a:pPr>
             <a:r>
-              <a:rPr lang="de-DE" dirty="0"/>
-              <a:t>Kann noch weiter optimiert werden (aktuell O(n^2))</a:t>
-            </a:r>
+              <a:rPr lang="de-DE" dirty="0" smtClean="0"/>
+              <a:t>Benutzt für </a:t>
+            </a:r>
+            <a:r>
+              <a:rPr lang="de-DE" dirty="0" err="1" smtClean="0"/>
+              <a:t>root</a:t>
+            </a:r>
+            <a:r>
+              <a:rPr lang="de-DE" dirty="0" smtClean="0"/>
+              <a:t> </a:t>
+            </a:r>
+            <a:r>
+              <a:rPr lang="de-DE" dirty="0" err="1" smtClean="0"/>
+              <a:t>Tonelli</a:t>
+            </a:r>
+            <a:r>
+              <a:rPr lang="de-DE" dirty="0" smtClean="0"/>
+              <a:t> </a:t>
+            </a:r>
+            <a:r>
+              <a:rPr lang="de-DE" dirty="0" err="1" smtClean="0"/>
+              <a:t>Shanks</a:t>
+            </a:r>
+            <a:r>
+              <a:rPr lang="de-DE" dirty="0" smtClean="0"/>
+              <a:t> Algorithmus</a:t>
+            </a:r>
+            <a:endParaRPr lang="de-DE" dirty="0"/>
           </a:p>
         </p:txBody>
       </p:sp>
@@ -5801,7 +6175,7 @@
           <p:cNvPr id="2" name="Title 1">
             <a:extLst>
               <a:ext uri="{FF2B5EF4-FFF2-40B4-BE49-F238E27FC236}">
-                <a16:creationId xmlns:a16="http://schemas.microsoft.com/office/drawing/2014/main" id="{AA658EFC-37A1-BC41-994E-5B1DA5AC8FE8}"/>
+                <a16:creationId xmlns:a16="http://schemas.microsoft.com/office/drawing/2014/main" xmlns="" id="{AA658EFC-37A1-BC41-994E-5B1DA5AC8FE8}"/>
               </a:ext>
             </a:extLst>
           </p:cNvPr>
@@ -5814,7 +6188,9 @@
         </p:nvSpPr>
         <p:spPr/>
         <p:txBody>
-          <a:bodyPr/>
+          <a:bodyPr>
+            <a:normAutofit fontScale="90000"/>
+          </a:bodyPr>
           <a:lstStyle/>
           <a:p>
             <a:r>
@@ -5833,7 +6209,7 @@
           <p:cNvPr id="3" name="Content Placeholder 2">
             <a:extLst>
               <a:ext uri="{FF2B5EF4-FFF2-40B4-BE49-F238E27FC236}">
-                <a16:creationId xmlns:a16="http://schemas.microsoft.com/office/drawing/2014/main" id="{3E1D882D-1010-DA4A-8619-72A189296653}"/>
+                <a16:creationId xmlns:a16="http://schemas.microsoft.com/office/drawing/2014/main" xmlns="" id="{3E1D882D-1010-DA4A-8619-72A189296653}"/>
               </a:ext>
             </a:extLst>
           </p:cNvPr>
@@ -6367,6 +6743,10 @@
             <a:pPr marL="0" indent="0">
               <a:buNone/>
             </a:pPr>
+            <a:r>
+              <a:rPr lang="de-DE" dirty="0"/>
+              <a:t/>
+            </a:r>
             <a:br>
               <a:rPr lang="de-DE" dirty="0"/>
             </a:br>
@@ -6477,7 +6857,7 @@
           <p:cNvPr id="2" name="Title 1">
             <a:extLst>
               <a:ext uri="{FF2B5EF4-FFF2-40B4-BE49-F238E27FC236}">
-                <a16:creationId xmlns:a16="http://schemas.microsoft.com/office/drawing/2014/main" id="{D5586AD6-A0E7-1F4D-B07E-EA3BFE7F7C9D}"/>
+                <a16:creationId xmlns:a16="http://schemas.microsoft.com/office/drawing/2014/main" xmlns="" id="{D5586AD6-A0E7-1F4D-B07E-EA3BFE7F7C9D}"/>
               </a:ext>
             </a:extLst>
           </p:cNvPr>
@@ -6505,7 +6885,7 @@
           <p:cNvPr id="3" name="Content Placeholder 2">
             <a:extLst>
               <a:ext uri="{FF2B5EF4-FFF2-40B4-BE49-F238E27FC236}">
-                <a16:creationId xmlns:a16="http://schemas.microsoft.com/office/drawing/2014/main" id="{07EB867D-74C3-FF42-B23D-28E5DB360A3A}"/>
+                <a16:creationId xmlns:a16="http://schemas.microsoft.com/office/drawing/2014/main" xmlns="" id="{07EB867D-74C3-FF42-B23D-28E5DB360A3A}"/>
               </a:ext>
             </a:extLst>
           </p:cNvPr>
@@ -6603,7 +6983,7 @@
           <p:cNvPr id="2" name="Title 1">
             <a:extLst>
               <a:ext uri="{FF2B5EF4-FFF2-40B4-BE49-F238E27FC236}">
-                <a16:creationId xmlns:a16="http://schemas.microsoft.com/office/drawing/2014/main" id="{CCC8E892-8DA3-D840-90B8-FBA3AF5C7396}"/>
+                <a16:creationId xmlns:a16="http://schemas.microsoft.com/office/drawing/2014/main" xmlns="" id="{CCC8E892-8DA3-D840-90B8-FBA3AF5C7396}"/>
               </a:ext>
             </a:extLst>
           </p:cNvPr>
@@ -6636,7 +7016,7 @@
           <p:cNvPr id="3" name="Content Placeholder 2">
             <a:extLst>
               <a:ext uri="{FF2B5EF4-FFF2-40B4-BE49-F238E27FC236}">
-                <a16:creationId xmlns:a16="http://schemas.microsoft.com/office/drawing/2014/main" id="{536C33F7-3511-C749-A209-591B7A4C7850}"/>
+                <a16:creationId xmlns:a16="http://schemas.microsoft.com/office/drawing/2014/main" xmlns="" id="{536C33F7-3511-C749-A209-591B7A4C7850}"/>
               </a:ext>
             </a:extLst>
           </p:cNvPr>
@@ -6765,6 +7145,14 @@
             <a:pPr marL="0" indent="0">
               <a:buNone/>
             </a:pPr>
+            <a:r>
+              <a:rPr lang="de-DE" dirty="0">
+                <a:solidFill>
+                  <a:srgbClr val="BBB529"/>
+                </a:solidFill>
+              </a:rPr>
+              <a:t/>
+            </a:r>
             <a:br>
               <a:rPr lang="de-DE" dirty="0">
                 <a:solidFill>
@@ -7002,6 +7390,10 @@
               </a:rPr>
               <a:t>;</a:t>
             </a:r>
+            <a:r>
+              <a:rPr lang="de-DE" dirty="0"/>
+              <a:t/>
+            </a:r>
             <a:br>
               <a:rPr lang="de-DE" dirty="0"/>
             </a:br>
@@ -7107,6 +7499,14 @@
                 </a:solidFill>
               </a:rPr>
             </a:br>
+            <a:r>
+              <a:rPr lang="de-DE" dirty="0">
+                <a:solidFill>
+                  <a:srgbClr val="CC7832"/>
+                </a:solidFill>
+              </a:rPr>
+              <a:t/>
+            </a:r>
             <a:br>
               <a:rPr lang="de-DE" dirty="0">
                 <a:solidFill>
@@ -7427,6 +7827,10 @@
             <a:br>
               <a:rPr lang="de-DE" dirty="0"/>
             </a:br>
+            <a:r>
+              <a:rPr lang="de-DE" dirty="0"/>
+              <a:t/>
+            </a:r>
             <a:br>
               <a:rPr lang="de-DE" dirty="0"/>
             </a:br>
@@ -7532,7 +7936,7 @@
     </a:clrScheme>
     <a:fontScheme name="Office">
       <a:majorFont>
-        <a:latin typeface="Calibri Light" panose="020F0302020204030204"/>
+        <a:latin typeface="Calibri Light"/>
         <a:ea typeface=""/>
         <a:cs typeface=""/>
         <a:font script="Jpan" typeface="游ゴシック Light"/>
@@ -7584,7 +7988,7 @@
         <a:font script="Tfng" typeface="Ebrima"/>
       </a:majorFont>
       <a:minorFont>
-        <a:latin typeface="Calibri" panose="020F0502020204030204"/>
+        <a:latin typeface="Calibri"/>
         <a:ea typeface=""/>
         <a:cs typeface=""/>
         <a:font script="Jpan" typeface="游ゴシック"/>
@@ -7778,7 +8182,7 @@
   <a:extraClrSchemeLst/>
   <a:extLst>
     <a:ext uri="{05A4C25C-085E-4340-85A3-A5531E510DB2}">
-      <thm15:themeFamily xmlns:thm15="http://schemas.microsoft.com/office/thememl/2012/main" name="Office Theme" id="{62F939B6-93AF-4DB8-9C6B-D6C7DFDC589F}" vid="{4A3C46E8-61CC-4603-A589-7422A47A8E4A}"/>
+      <thm15:themeFamily xmlns:thm15="http://schemas.microsoft.com/office/thememl/2012/main" xmlns="" name="Office Theme" id="{62F939B6-93AF-4DB8-9C6B-D6C7DFDC589F}" vid="{4A3C46E8-61CC-4603-A589-7422A47A8E4A}"/>
     </a:ext>
   </a:extLst>
 </a:theme>

</xml_diff>